<commit_message>
Adding slides and schedule for last two modules
</commit_message>
<xml_diff>
--- a/slides/Network-Flow.pptx
+++ b/slides/Network-Flow.pptx
@@ -5,10 +5,10 @@
     <p:sldMasterId id="2147483714" r:id="rId1"/>
   </p:sldMasterIdLst>
   <p:notesMasterIdLst>
-    <p:notesMasterId r:id="rId54"/>
+    <p:notesMasterId r:id="rId26"/>
   </p:notesMasterIdLst>
   <p:handoutMasterIdLst>
-    <p:handoutMasterId r:id="rId55"/>
+    <p:handoutMasterId r:id="rId27"/>
   </p:handoutMasterIdLst>
   <p:sldIdLst>
     <p:sldId id="377" r:id="rId2"/>
@@ -35,39 +35,11 @@
     <p:sldId id="440" r:id="rId23"/>
     <p:sldId id="435" r:id="rId24"/>
     <p:sldId id="401" r:id="rId25"/>
-    <p:sldId id="407" r:id="rId26"/>
-    <p:sldId id="402" r:id="rId27"/>
-    <p:sldId id="403" r:id="rId28"/>
-    <p:sldId id="404" r:id="rId29"/>
-    <p:sldId id="405" r:id="rId30"/>
-    <p:sldId id="388" r:id="rId31"/>
-    <p:sldId id="385" r:id="rId32"/>
-    <p:sldId id="386" r:id="rId33"/>
-    <p:sldId id="387" r:id="rId34"/>
-    <p:sldId id="408" r:id="rId35"/>
-    <p:sldId id="413" r:id="rId36"/>
-    <p:sldId id="414" r:id="rId37"/>
-    <p:sldId id="415" r:id="rId38"/>
-    <p:sldId id="416" r:id="rId39"/>
-    <p:sldId id="417" r:id="rId40"/>
-    <p:sldId id="418" r:id="rId41"/>
-    <p:sldId id="419" r:id="rId42"/>
-    <p:sldId id="409" r:id="rId43"/>
-    <p:sldId id="422" r:id="rId44"/>
-    <p:sldId id="423" r:id="rId45"/>
-    <p:sldId id="425" r:id="rId46"/>
-    <p:sldId id="432" r:id="rId47"/>
-    <p:sldId id="424" r:id="rId48"/>
-    <p:sldId id="426" r:id="rId49"/>
-    <p:sldId id="427" r:id="rId50"/>
-    <p:sldId id="428" r:id="rId51"/>
-    <p:sldId id="420" r:id="rId52"/>
-    <p:sldId id="410" r:id="rId53"/>
   </p:sldIdLst>
-  <p:sldSz cx="9144000" cy="6858000" type="screen4x3"/>
+  <p:sldSz cx="12192000" cy="6858000"/>
   <p:notesSz cx="7315200" cy="9601200"/>
   <p:custDataLst>
-    <p:tags r:id="rId56"/>
+    <p:tags r:id="rId28"/>
   </p:custDataLst>
   <p:defaultTextStyle>
     <a:defPPr>
@@ -197,12 +169,12 @@
   <p:extLst>
     <p:ext uri="{EFAFB233-063F-42B5-8137-9DF3F51BA10A}">
       <p15:sldGuideLst xmlns:p15="http://schemas.microsoft.com/office/powerpoint/2012/main">
-        <p15:guide id="1" orient="horz" pos="2160">
+        <p15:guide id="1" orient="horz" pos="2160" userDrawn="1">
           <p15:clr>
             <a:srgbClr val="A4A3A4"/>
           </p15:clr>
         </p15:guide>
-        <p15:guide id="2" pos="2880">
+        <p15:guide id="2" pos="3840" userDrawn="1">
           <p15:clr>
             <a:srgbClr val="A4A3A4"/>
           </p15:clr>
@@ -593,8 +565,8 @@
         </p:nvSpPr>
         <p:spPr bwMode="auto">
           <a:xfrm>
-            <a:off x="1257300" y="720725"/>
-            <a:ext cx="4800600" cy="3600450"/>
+            <a:off x="457200" y="720725"/>
+            <a:ext cx="6400800" cy="3600450"/>
           </a:xfrm>
           <a:prstGeom prst="rect">
             <a:avLst/>
@@ -940,8 +912,8 @@
         </p:nvSpPr>
         <p:spPr>
           <a:xfrm>
-            <a:off x="1219200" y="2752725"/>
-            <a:ext cx="6858000" cy="990600"/>
+            <a:off x="1625600" y="2752725"/>
+            <a:ext cx="9144000" cy="990600"/>
           </a:xfrm>
         </p:spPr>
         <p:txBody>
@@ -975,8 +947,8 @@
         </p:nvSpPr>
         <p:spPr>
           <a:xfrm>
-            <a:off x="1219200" y="4191000"/>
-            <a:ext cx="6858000" cy="1466850"/>
+            <a:off x="1625600" y="4191000"/>
+            <a:ext cx="9144000" cy="1466850"/>
           </a:xfrm>
         </p:spPr>
         <p:txBody>
@@ -1039,8 +1011,8 @@
         </p:nvSpPr>
         <p:spPr>
           <a:xfrm>
-            <a:off x="6400800" y="6355080"/>
-            <a:ext cx="2286000" cy="365760"/>
+            <a:off x="8534400" y="6355080"/>
+            <a:ext cx="3048000" cy="365760"/>
           </a:xfrm>
         </p:spPr>
         <p:txBody>
@@ -1070,8 +1042,8 @@
         </p:nvSpPr>
         <p:spPr>
           <a:xfrm>
-            <a:off x="2898648" y="6355080"/>
-            <a:ext cx="3474720" cy="365760"/>
+            <a:off x="3864864" y="6355080"/>
+            <a:ext cx="4632960" cy="365760"/>
           </a:xfrm>
         </p:spPr>
         <p:txBody>
@@ -1094,8 +1066,8 @@
         </p:nvSpPr>
         <p:spPr>
           <a:xfrm>
-            <a:off x="1216152" y="6355080"/>
-            <a:ext cx="1219200" cy="365760"/>
+            <a:off x="1621536" y="6355080"/>
+            <a:ext cx="1625600" cy="365760"/>
           </a:xfrm>
         </p:spPr>
         <p:txBody>
@@ -1119,8 +1091,8 @@
         </p:nvSpPr>
         <p:spPr>
           <a:xfrm>
-            <a:off x="904875" y="2514600"/>
-            <a:ext cx="7315200" cy="1280160"/>
+            <a:off x="1206500" y="2514600"/>
+            <a:ext cx="9753600" cy="1280160"/>
           </a:xfrm>
           <a:prstGeom prst="rect">
             <a:avLst/>
@@ -1153,7 +1125,7 @@
           <a:lstStyle/>
           <a:p>
             <a:pPr algn="ctr" eaLnBrk="1" latinLnBrk="0" hangingPunct="1"/>
-            <a:endParaRPr kumimoji="0" lang="en-US"/>
+            <a:endParaRPr kumimoji="0" lang="en-US" sz="2400"/>
           </a:p>
         </p:txBody>
       </p:sp>
@@ -1165,8 +1137,8 @@
         </p:nvSpPr>
         <p:spPr>
           <a:xfrm>
-            <a:off x="914400" y="4114800"/>
-            <a:ext cx="7315200" cy="1619250"/>
+            <a:off x="1219200" y="4114800"/>
+            <a:ext cx="9753600" cy="1619250"/>
           </a:xfrm>
           <a:prstGeom prst="rect">
             <a:avLst/>
@@ -1199,7 +1171,7 @@
           <a:lstStyle/>
           <a:p>
             <a:pPr algn="ctr" eaLnBrk="1" latinLnBrk="0" hangingPunct="1"/>
-            <a:endParaRPr kumimoji="0" lang="en-US"/>
+            <a:endParaRPr kumimoji="0" lang="en-US" sz="2400"/>
           </a:p>
         </p:txBody>
       </p:sp>
@@ -1211,8 +1183,8 @@
         </p:nvSpPr>
         <p:spPr>
           <a:xfrm>
-            <a:off x="904875" y="2514600"/>
-            <a:ext cx="228600" cy="1280160"/>
+            <a:off x="1206500" y="2514600"/>
+            <a:ext cx="304800" cy="1280160"/>
           </a:xfrm>
           <a:prstGeom prst="rect">
             <a:avLst/>
@@ -1245,7 +1217,7 @@
           <a:lstStyle/>
           <a:p>
             <a:pPr algn="ctr" eaLnBrk="1" latinLnBrk="0" hangingPunct="1"/>
-            <a:endParaRPr kumimoji="0" lang="en-US"/>
+            <a:endParaRPr kumimoji="0" lang="en-US" sz="2400"/>
           </a:p>
         </p:txBody>
       </p:sp>
@@ -1257,8 +1229,8 @@
         </p:nvSpPr>
         <p:spPr>
           <a:xfrm>
-            <a:off x="914400" y="4114800"/>
-            <a:ext cx="228600" cy="1619250"/>
+            <a:off x="1219200" y="4114800"/>
+            <a:ext cx="304800" cy="1619250"/>
           </a:xfrm>
           <a:prstGeom prst="rect">
             <a:avLst/>
@@ -1291,7 +1263,7 @@
           <a:lstStyle/>
           <a:p>
             <a:pPr algn="ctr" eaLnBrk="1" latinLnBrk="0" hangingPunct="1"/>
-            <a:endParaRPr kumimoji="0" lang="en-US"/>
+            <a:endParaRPr kumimoji="0" lang="en-US" sz="2400"/>
           </a:p>
         </p:txBody>
       </p:sp>
@@ -1496,8 +1468,8 @@
         </p:nvSpPr>
         <p:spPr>
           <a:xfrm>
-            <a:off x="6629400" y="274638"/>
-            <a:ext cx="2057400" cy="5851525"/>
+            <a:off x="8839200" y="274639"/>
+            <a:ext cx="2743200" cy="5851525"/>
           </a:xfrm>
         </p:spPr>
         <p:txBody>
@@ -1523,8 +1495,8 @@
         </p:nvSpPr>
         <p:spPr>
           <a:xfrm>
-            <a:off x="457200" y="274638"/>
-            <a:ext cx="6019800" cy="5851525"/>
+            <a:off x="609600" y="274639"/>
+            <a:ext cx="8026400" cy="5851525"/>
           </a:xfrm>
         </p:spPr>
         <p:txBody>
@@ -1643,8 +1615,8 @@
         </p:nvSpPr>
         <p:spPr bwMode="auto">
           <a:xfrm>
-            <a:off x="457200" y="6353175"/>
-            <a:ext cx="8229600" cy="0"/>
+            <a:off x="609600" y="6353175"/>
+            <a:ext cx="10972800" cy="0"/>
           </a:xfrm>
           <a:prstGeom prst="line">
             <a:avLst/>
@@ -1665,7 +1637,7 @@
           <a:bodyPr vert="horz" wrap="square" lIns="91440" tIns="45720" rIns="91440" bIns="45720" anchor="t" compatLnSpc="1"/>
           <a:lstStyle/>
           <a:p>
-            <a:endParaRPr kumimoji="0" lang="en-US"/>
+            <a:endParaRPr kumimoji="0" lang="en-US" sz="2400"/>
           </a:p>
         </p:txBody>
       </p:sp>
@@ -1679,8 +1651,8 @@
         </p:nvSpPr>
         <p:spPr>
           <a:xfrm rot="5400000">
-            <a:off x="419100" y="6467475"/>
-            <a:ext cx="190849" cy="120314"/>
+            <a:off x="590609" y="6447423"/>
+            <a:ext cx="190849" cy="160419"/>
           </a:xfrm>
           <a:prstGeom prst="triangle">
             <a:avLst>
@@ -1715,7 +1687,7 @@
           <a:lstStyle/>
           <a:p>
             <a:pPr algn="ctr" eaLnBrk="1" latinLnBrk="0" hangingPunct="1"/>
-            <a:endParaRPr kumimoji="0" lang="en-US"/>
+            <a:endParaRPr kumimoji="0" lang="en-US" sz="2400"/>
           </a:p>
         </p:txBody>
       </p:sp>
@@ -1729,7 +1701,7 @@
         </p:nvSpPr>
         <p:spPr bwMode="auto">
           <a:xfrm rot="5400000">
-            <a:off x="3629607" y="3201952"/>
+            <a:off x="5814836" y="3201952"/>
             <a:ext cx="5852160" cy="0"/>
           </a:xfrm>
           <a:prstGeom prst="line">
@@ -1751,7 +1723,7 @@
           <a:bodyPr vert="horz" wrap="square" lIns="91440" tIns="45720" rIns="91440" bIns="45720" anchor="t" compatLnSpc="1"/>
           <a:lstStyle/>
           <a:p>
-            <a:endParaRPr kumimoji="0" lang="en-US"/>
+            <a:endParaRPr kumimoji="0" lang="en-US" sz="2400"/>
           </a:p>
         </p:txBody>
       </p:sp>
@@ -1792,8 +1764,8 @@
         </p:nvSpPr>
         <p:spPr>
           <a:xfrm>
-            <a:off x="457200" y="274638"/>
-            <a:ext cx="8229600" cy="1143000"/>
+            <a:off x="609600" y="274638"/>
+            <a:ext cx="10972800" cy="1143000"/>
           </a:xfrm>
         </p:spPr>
         <p:txBody>
@@ -1819,8 +1791,8 @@
         </p:nvSpPr>
         <p:spPr>
           <a:xfrm>
-            <a:off x="457200" y="1600200"/>
-            <a:ext cx="8229600" cy="4525963"/>
+            <a:off x="609600" y="1600201"/>
+            <a:ext cx="10972800" cy="4525963"/>
           </a:xfrm>
         </p:spPr>
         <p:txBody>
@@ -1873,8 +1845,8 @@
         </p:nvSpPr>
         <p:spPr>
           <a:xfrm>
-            <a:off x="381000" y="228600"/>
-            <a:ext cx="8229600" cy="685800"/>
+            <a:off x="508000" y="228600"/>
+            <a:ext cx="10972800" cy="685800"/>
           </a:xfrm>
         </p:spPr>
         <p:txBody>
@@ -1900,8 +1872,8 @@
         </p:nvSpPr>
         <p:spPr>
           <a:xfrm>
-            <a:off x="381000" y="1371600"/>
-            <a:ext cx="4051300" cy="5257800"/>
+            <a:off x="508000" y="1371600"/>
+            <a:ext cx="5401733" cy="5257800"/>
           </a:xfrm>
         </p:spPr>
         <p:txBody>
@@ -1956,8 +1928,8 @@
         </p:nvSpPr>
         <p:spPr>
           <a:xfrm>
-            <a:off x="4584700" y="1371600"/>
-            <a:ext cx="4051300" cy="2552700"/>
+            <a:off x="6112934" y="1371600"/>
+            <a:ext cx="5401733" cy="2552700"/>
           </a:xfrm>
         </p:spPr>
         <p:txBody>
@@ -2012,8 +1984,8 @@
         </p:nvSpPr>
         <p:spPr>
           <a:xfrm>
-            <a:off x="4584700" y="4076700"/>
-            <a:ext cx="4051300" cy="2552700"/>
+            <a:off x="6112934" y="4076700"/>
+            <a:ext cx="5401733" cy="2552700"/>
           </a:xfrm>
         </p:spPr>
         <p:txBody>
@@ -2180,8 +2152,8 @@
         </p:nvSpPr>
         <p:spPr>
           <a:xfrm>
-            <a:off x="457200" y="1219200"/>
-            <a:ext cx="8229600" cy="4937760"/>
+            <a:off x="609600" y="1219200"/>
+            <a:ext cx="10972800" cy="4937760"/>
           </a:xfrm>
         </p:spPr>
         <p:txBody>
@@ -2283,8 +2255,8 @@
         </p:nvSpPr>
         <p:spPr>
           <a:xfrm>
-            <a:off x="1219200" y="2971800"/>
-            <a:ext cx="6858000" cy="1066800"/>
+            <a:off x="1625600" y="2971800"/>
+            <a:ext cx="9144000" cy="1066800"/>
           </a:xfrm>
         </p:spPr>
         <p:txBody>
@@ -2315,8 +2287,8 @@
         </p:nvSpPr>
         <p:spPr>
           <a:xfrm>
-            <a:off x="1295400" y="4267200"/>
-            <a:ext cx="6781800" cy="1143000"/>
+            <a:off x="1727200" y="4267200"/>
+            <a:ext cx="9042400" cy="1143000"/>
           </a:xfrm>
         </p:spPr>
         <p:txBody>
@@ -2394,8 +2366,8 @@
         </p:nvSpPr>
         <p:spPr>
           <a:xfrm>
-            <a:off x="6400800" y="6355080"/>
-            <a:ext cx="2286000" cy="365760"/>
+            <a:off x="8534400" y="6355080"/>
+            <a:ext cx="3048000" cy="365760"/>
           </a:xfrm>
         </p:spPr>
         <p:txBody>
@@ -2421,8 +2393,8 @@
         </p:nvSpPr>
         <p:spPr>
           <a:xfrm>
-            <a:off x="2898648" y="6355080"/>
-            <a:ext cx="3474720" cy="365760"/>
+            <a:off x="3864864" y="6355080"/>
+            <a:ext cx="4632960" cy="365760"/>
           </a:xfrm>
         </p:spPr>
         <p:txBody>
@@ -2445,8 +2417,8 @@
         </p:nvSpPr>
         <p:spPr>
           <a:xfrm>
-            <a:off x="1069848" y="6355080"/>
-            <a:ext cx="1520952" cy="365760"/>
+            <a:off x="1426464" y="6355080"/>
+            <a:ext cx="2027936" cy="365760"/>
           </a:xfrm>
         </p:spPr>
         <p:txBody>
@@ -2470,8 +2442,8 @@
         </p:nvSpPr>
         <p:spPr>
           <a:xfrm>
-            <a:off x="914400" y="2819400"/>
-            <a:ext cx="7315200" cy="1280160"/>
+            <a:off x="1219200" y="2819400"/>
+            <a:ext cx="9753600" cy="1280160"/>
           </a:xfrm>
           <a:prstGeom prst="rect">
             <a:avLst/>
@@ -2504,7 +2476,7 @@
           <a:lstStyle/>
           <a:p>
             <a:pPr algn="ctr" eaLnBrk="1" latinLnBrk="0" hangingPunct="1"/>
-            <a:endParaRPr kumimoji="0" lang="en-US"/>
+            <a:endParaRPr kumimoji="0" lang="en-US" sz="2400"/>
           </a:p>
         </p:txBody>
       </p:sp>
@@ -2516,8 +2488,8 @@
         </p:nvSpPr>
         <p:spPr>
           <a:xfrm>
-            <a:off x="914400" y="2819400"/>
-            <a:ext cx="228600" cy="1280160"/>
+            <a:off x="1219200" y="2819400"/>
+            <a:ext cx="304800" cy="1280160"/>
           </a:xfrm>
           <a:prstGeom prst="rect">
             <a:avLst/>
@@ -2550,7 +2522,7 @@
           <a:lstStyle/>
           <a:p>
             <a:pPr algn="ctr" eaLnBrk="1" latinLnBrk="0" hangingPunct="1"/>
-            <a:endParaRPr kumimoji="0" lang="en-US"/>
+            <a:endParaRPr kumimoji="0" lang="en-US" sz="2400"/>
           </a:p>
         </p:txBody>
       </p:sp>
@@ -2591,8 +2563,8 @@
         </p:nvSpPr>
         <p:spPr>
           <a:xfrm>
-            <a:off x="457200" y="228600"/>
-            <a:ext cx="8229600" cy="914400"/>
+            <a:off x="609600" y="228600"/>
+            <a:ext cx="10972800" cy="914400"/>
           </a:xfrm>
         </p:spPr>
         <p:txBody>
@@ -2683,8 +2655,8 @@
         </p:nvSpPr>
         <p:spPr>
           <a:xfrm>
-            <a:off x="457200" y="1219200"/>
-            <a:ext cx="4041648" cy="4937760"/>
+            <a:off x="609600" y="1219200"/>
+            <a:ext cx="5388864" cy="4937760"/>
           </a:xfrm>
         </p:spPr>
         <p:txBody>
@@ -2740,8 +2712,8 @@
         </p:nvSpPr>
         <p:spPr>
           <a:xfrm>
-            <a:off x="4632198" y="1216152"/>
-            <a:ext cx="4041648" cy="4937760"/>
+            <a:off x="6176264" y="1216152"/>
+            <a:ext cx="5388864" cy="4937760"/>
           </a:xfrm>
         </p:spPr>
         <p:txBody>
@@ -2822,8 +2794,8 @@
         </p:nvSpPr>
         <p:spPr>
           <a:xfrm>
-            <a:off x="457200" y="228600"/>
-            <a:ext cx="8229600" cy="914400"/>
+            <a:off x="609600" y="228600"/>
+            <a:ext cx="10972800" cy="914400"/>
           </a:xfrm>
         </p:spPr>
         <p:txBody>
@@ -2853,8 +2825,8 @@
         </p:nvSpPr>
         <p:spPr>
           <a:xfrm>
-            <a:off x="457200" y="1285875"/>
-            <a:ext cx="4040188" cy="685800"/>
+            <a:off x="609600" y="1285875"/>
+            <a:ext cx="5386917" cy="685800"/>
           </a:xfrm>
           <a:noFill/>
           <a:ln>
@@ -2912,8 +2884,8 @@
         </p:nvSpPr>
         <p:spPr>
           <a:xfrm>
-            <a:off x="4648200" y="1295400"/>
-            <a:ext cx="4041775" cy="685800"/>
+            <a:off x="6197601" y="1295400"/>
+            <a:ext cx="5389033" cy="685800"/>
           </a:xfrm>
           <a:noFill/>
           <a:ln>
@@ -3034,8 +3006,8 @@
         </p:nvSpPr>
         <p:spPr>
           <a:xfrm>
-            <a:off x="457200" y="2133600"/>
-            <a:ext cx="4038600" cy="4038600"/>
+            <a:off x="609600" y="2133600"/>
+            <a:ext cx="5384800" cy="4038600"/>
           </a:xfrm>
         </p:spPr>
         <p:txBody>
@@ -3091,8 +3063,8 @@
         </p:nvSpPr>
         <p:spPr>
           <a:xfrm>
-            <a:off x="4648200" y="2133600"/>
-            <a:ext cx="4038600" cy="4038600"/>
+            <a:off x="6197600" y="2133600"/>
+            <a:ext cx="5384800" cy="4038600"/>
           </a:xfrm>
         </p:spPr>
         <p:txBody>
@@ -3173,8 +3145,8 @@
         </p:nvSpPr>
         <p:spPr>
           <a:xfrm>
-            <a:off x="457200" y="228600"/>
-            <a:ext cx="8229600" cy="914400"/>
+            <a:off x="609600" y="228600"/>
+            <a:ext cx="10972800" cy="914400"/>
           </a:xfrm>
         </p:spPr>
         <p:txBody>
@@ -3263,8 +3235,8 @@
         </p:nvSpPr>
         <p:spPr>
           <a:xfrm rot="5400000">
-            <a:off x="419100" y="6467475"/>
-            <a:ext cx="190849" cy="120314"/>
+            <a:off x="590609" y="6447423"/>
+            <a:ext cx="190849" cy="160419"/>
           </a:xfrm>
           <a:prstGeom prst="triangle">
             <a:avLst>
@@ -3299,7 +3271,7 @@
           <a:lstStyle/>
           <a:p>
             <a:pPr algn="ctr" eaLnBrk="1" latinLnBrk="0" hangingPunct="1"/>
-            <a:endParaRPr kumimoji="0" lang="en-US"/>
+            <a:endParaRPr kumimoji="0" lang="en-US" sz="2400"/>
           </a:p>
         </p:txBody>
       </p:sp>
@@ -3403,8 +3375,8 @@
         </p:nvSpPr>
         <p:spPr bwMode="auto">
           <a:xfrm>
-            <a:off x="457200" y="6353175"/>
-            <a:ext cx="8229600" cy="0"/>
+            <a:off x="609600" y="6353175"/>
+            <a:ext cx="10972800" cy="0"/>
           </a:xfrm>
           <a:prstGeom prst="line">
             <a:avLst/>
@@ -3425,7 +3397,7 @@
           <a:bodyPr vert="horz" wrap="square" lIns="91440" tIns="45720" rIns="91440" bIns="45720" anchor="t" compatLnSpc="1"/>
           <a:lstStyle/>
           <a:p>
-            <a:endParaRPr kumimoji="0" lang="en-US"/>
+            <a:endParaRPr kumimoji="0" lang="en-US" sz="2400"/>
           </a:p>
         </p:txBody>
       </p:sp>
@@ -3439,8 +3411,8 @@
         </p:nvSpPr>
         <p:spPr>
           <a:xfrm rot="5400000">
-            <a:off x="419100" y="6467475"/>
-            <a:ext cx="190849" cy="120314"/>
+            <a:off x="590609" y="6447423"/>
+            <a:ext cx="190849" cy="160419"/>
           </a:xfrm>
           <a:prstGeom prst="triangle">
             <a:avLst>
@@ -3475,7 +3447,7 @@
           <a:lstStyle/>
           <a:p>
             <a:pPr algn="ctr" eaLnBrk="1" latinLnBrk="0" hangingPunct="1"/>
-            <a:endParaRPr kumimoji="0" lang="en-US"/>
+            <a:endParaRPr kumimoji="0" lang="en-US" sz="2400"/>
           </a:p>
         </p:txBody>
       </p:sp>
@@ -3516,8 +3488,8 @@
         </p:nvSpPr>
         <p:spPr>
           <a:xfrm>
-            <a:off x="6324600" y="304800"/>
-            <a:ext cx="2514600" cy="838200"/>
+            <a:off x="8432800" y="304800"/>
+            <a:ext cx="3352800" cy="838200"/>
           </a:xfrm>
         </p:spPr>
         <p:txBody>
@@ -3557,8 +3529,8 @@
         </p:nvSpPr>
         <p:spPr>
           <a:xfrm>
-            <a:off x="6324600" y="1219200"/>
-            <a:ext cx="2514600" cy="4843463"/>
+            <a:off x="8432800" y="1219201"/>
+            <a:ext cx="3352800" cy="4843463"/>
           </a:xfrm>
         </p:spPr>
         <p:txBody>
@@ -3679,8 +3651,8 @@
         </p:nvSpPr>
         <p:spPr bwMode="auto">
           <a:xfrm>
-            <a:off x="457200" y="6353175"/>
-            <a:ext cx="8229600" cy="0"/>
+            <a:off x="609600" y="6353175"/>
+            <a:ext cx="10972800" cy="0"/>
           </a:xfrm>
           <a:prstGeom prst="line">
             <a:avLst/>
@@ -3701,7 +3673,7 @@
           <a:bodyPr vert="horz" wrap="square" lIns="91440" tIns="45720" rIns="91440" bIns="45720" anchor="t" compatLnSpc="1"/>
           <a:lstStyle/>
           <a:p>
-            <a:endParaRPr kumimoji="0" lang="en-US"/>
+            <a:endParaRPr kumimoji="0" lang="en-US" sz="2400"/>
           </a:p>
         </p:txBody>
       </p:sp>
@@ -3715,7 +3687,7 @@
         </p:nvSpPr>
         <p:spPr bwMode="auto">
           <a:xfrm rot="5400000">
-            <a:off x="3160645" y="3324225"/>
+            <a:off x="5220033" y="3324225"/>
             <a:ext cx="6035040" cy="0"/>
           </a:xfrm>
           <a:prstGeom prst="line">
@@ -3737,7 +3709,7 @@
           <a:bodyPr vert="horz" wrap="square" lIns="91440" tIns="45720" rIns="91440" bIns="45720" anchor="t" compatLnSpc="1"/>
           <a:lstStyle/>
           <a:p>
-            <a:endParaRPr kumimoji="0" lang="en-US" dirty="0"/>
+            <a:endParaRPr kumimoji="0" lang="en-US" sz="2400" dirty="0"/>
           </a:p>
         </p:txBody>
       </p:sp>
@@ -3751,8 +3723,8 @@
         </p:nvSpPr>
         <p:spPr>
           <a:xfrm rot="5400000">
-            <a:off x="419100" y="6467475"/>
-            <a:ext cx="190849" cy="120314"/>
+            <a:off x="590609" y="6447423"/>
+            <a:ext cx="190849" cy="160419"/>
           </a:xfrm>
           <a:prstGeom prst="triangle">
             <a:avLst>
@@ -3787,7 +3759,7 @@
           <a:lstStyle/>
           <a:p>
             <a:pPr algn="ctr" eaLnBrk="1" latinLnBrk="0" hangingPunct="1"/>
-            <a:endParaRPr kumimoji="0" lang="en-US"/>
+            <a:endParaRPr kumimoji="0" lang="en-US" sz="2400"/>
           </a:p>
         </p:txBody>
       </p:sp>
@@ -3803,8 +3775,8 @@
         </p:nvSpPr>
         <p:spPr>
           <a:xfrm>
-            <a:off x="304800" y="304800"/>
-            <a:ext cx="5715000" cy="5715000"/>
+            <a:off x="406400" y="304800"/>
+            <a:ext cx="7620000" cy="5715000"/>
           </a:xfrm>
         </p:spPr>
         <p:txBody>
@@ -3890,8 +3862,8 @@
         </p:nvSpPr>
         <p:spPr>
           <a:xfrm>
-            <a:off x="457200" y="500856"/>
-            <a:ext cx="8229600" cy="674688"/>
+            <a:off x="609600" y="500856"/>
+            <a:ext cx="10972800" cy="674688"/>
           </a:xfrm>
           <a:ln>
             <a:solidFill>
@@ -3931,8 +3903,8 @@
         </p:nvSpPr>
         <p:spPr>
           <a:xfrm>
-            <a:off x="457200" y="1905000"/>
-            <a:ext cx="8229600" cy="4270248"/>
+            <a:off x="609600" y="1905000"/>
+            <a:ext cx="10972800" cy="4270248"/>
           </a:xfrm>
           <a:solidFill>
             <a:schemeClr val="tx1">
@@ -3976,8 +3948,8 @@
         </p:nvSpPr>
         <p:spPr>
           <a:xfrm>
-            <a:off x="457200" y="1219200"/>
-            <a:ext cx="8229600" cy="533400"/>
+            <a:off x="609600" y="1219200"/>
+            <a:ext cx="10972800" cy="533400"/>
           </a:xfrm>
         </p:spPr>
         <p:txBody>
@@ -4085,8 +4057,8 @@
         </p:nvSpPr>
         <p:spPr bwMode="auto">
           <a:xfrm>
-            <a:off x="457200" y="6353175"/>
-            <a:ext cx="8229600" cy="0"/>
+            <a:off x="609600" y="6353175"/>
+            <a:ext cx="10972800" cy="0"/>
           </a:xfrm>
           <a:prstGeom prst="line">
             <a:avLst/>
@@ -4107,7 +4079,7 @@
           <a:bodyPr vert="horz" wrap="square" lIns="91440" tIns="45720" rIns="91440" bIns="45720" anchor="t" compatLnSpc="1"/>
           <a:lstStyle/>
           <a:p>
-            <a:endParaRPr kumimoji="0" lang="en-US"/>
+            <a:endParaRPr kumimoji="0" lang="en-US" sz="2400"/>
           </a:p>
         </p:txBody>
       </p:sp>
@@ -4121,8 +4093,8 @@
         </p:nvSpPr>
         <p:spPr>
           <a:xfrm rot="5400000">
-            <a:off x="419100" y="6467475"/>
-            <a:ext cx="190849" cy="120314"/>
+            <a:off x="590609" y="6447423"/>
+            <a:ext cx="190849" cy="160419"/>
           </a:xfrm>
           <a:prstGeom prst="triangle">
             <a:avLst>
@@ -4157,7 +4129,7 @@
           <a:lstStyle/>
           <a:p>
             <a:pPr algn="ctr" eaLnBrk="1" latinLnBrk="0" hangingPunct="1"/>
-            <a:endParaRPr kumimoji="0" lang="en-US"/>
+            <a:endParaRPr kumimoji="0" lang="en-US" sz="2400"/>
           </a:p>
         </p:txBody>
       </p:sp>
@@ -4169,8 +4141,8 @@
         </p:nvSpPr>
         <p:spPr>
           <a:xfrm>
-            <a:off x="457200" y="500856"/>
-            <a:ext cx="182880" cy="685800"/>
+            <a:off x="609600" y="500856"/>
+            <a:ext cx="243840" cy="685800"/>
           </a:xfrm>
           <a:prstGeom prst="rect">
             <a:avLst/>
@@ -4203,7 +4175,7 @@
           <a:lstStyle/>
           <a:p>
             <a:pPr algn="ctr" eaLnBrk="1" latinLnBrk="0" hangingPunct="1"/>
-            <a:endParaRPr kumimoji="0" lang="en-US"/>
+            <a:endParaRPr kumimoji="0" lang="en-US" sz="2400"/>
           </a:p>
         </p:txBody>
       </p:sp>
@@ -4249,8 +4221,8 @@
         </p:nvSpPr>
         <p:spPr>
           <a:xfrm>
-            <a:off x="457200" y="152400"/>
-            <a:ext cx="8229600" cy="990600"/>
+            <a:off x="609600" y="152400"/>
+            <a:ext cx="10972800" cy="990600"/>
           </a:xfrm>
           <a:prstGeom prst="rect">
             <a:avLst/>
@@ -4281,8 +4253,8 @@
         </p:nvSpPr>
         <p:spPr>
           <a:xfrm>
-            <a:off x="457200" y="1219200"/>
-            <a:ext cx="8229600" cy="4910328"/>
+            <a:off x="609600" y="1219200"/>
+            <a:ext cx="10972800" cy="4910328"/>
           </a:xfrm>
           <a:prstGeom prst="rect">
             <a:avLst/>
@@ -4343,8 +4315,8 @@
         </p:nvSpPr>
         <p:spPr>
           <a:xfrm>
-            <a:off x="6400800" y="6356350"/>
-            <a:ext cx="2289048" cy="365760"/>
+            <a:off x="8534400" y="6356350"/>
+            <a:ext cx="3052064" cy="365760"/>
           </a:xfrm>
           <a:prstGeom prst="rect">
             <a:avLst/>
@@ -4381,8 +4353,8 @@
         </p:nvSpPr>
         <p:spPr>
           <a:xfrm>
-            <a:off x="2898648" y="6356350"/>
-            <a:ext cx="3505200" cy="365760"/>
+            <a:off x="3864864" y="6356350"/>
+            <a:ext cx="4673600" cy="365760"/>
           </a:xfrm>
           <a:prstGeom prst="rect">
             <a:avLst/>
@@ -4416,8 +4388,8 @@
         </p:nvSpPr>
         <p:spPr>
           <a:xfrm>
-            <a:off x="612648" y="6356350"/>
-            <a:ext cx="1981200" cy="365760"/>
+            <a:off x="816864" y="6356350"/>
+            <a:ext cx="2641600" cy="365760"/>
           </a:xfrm>
           <a:prstGeom prst="rect">
             <a:avLst/>
@@ -4454,8 +4426,8 @@
         </p:nvSpPr>
         <p:spPr bwMode="auto">
           <a:xfrm>
-            <a:off x="457200" y="1143000"/>
-            <a:ext cx="8229600" cy="0"/>
+            <a:off x="609600" y="1143000"/>
+            <a:ext cx="10972800" cy="0"/>
           </a:xfrm>
           <a:prstGeom prst="line">
             <a:avLst/>
@@ -4476,7 +4448,7 @@
           <a:bodyPr vert="horz" wrap="square" lIns="91440" tIns="45720" rIns="91440" bIns="45720" anchor="t" compatLnSpc="1"/>
           <a:lstStyle/>
           <a:p>
-            <a:endParaRPr kumimoji="0" lang="en-US"/>
+            <a:endParaRPr kumimoji="0" lang="en-US" sz="2400"/>
           </a:p>
         </p:txBody>
       </p:sp>
@@ -4866,7 +4838,7 @@
             </a:br>
             <a:r>
               <a:rPr lang="en-US" dirty="0"/>
-              <a:t>CS4102 – Spring 2021</a:t>
+              <a:t>CS4102 – Fall 2021</a:t>
             </a:r>
           </a:p>
         </p:txBody>
@@ -5767,7 +5739,7 @@
         </p:blipFill>
         <p:spPr bwMode="auto">
           <a:xfrm>
-            <a:off x="457200" y="2084103"/>
+            <a:off x="1981200" y="2084104"/>
             <a:ext cx="8229600" cy="3021297"/>
           </a:xfrm>
           <a:prstGeom prst="rect">
@@ -6178,7 +6150,7 @@
         </p:blipFill>
         <p:spPr bwMode="auto">
           <a:xfrm>
-            <a:off x="1981200" y="3561836"/>
+            <a:off x="3505200" y="3561837"/>
             <a:ext cx="5181600" cy="3100801"/>
           </a:xfrm>
           <a:prstGeom prst="rect">
@@ -6339,7 +6311,7 @@
         </p:blipFill>
         <p:spPr bwMode="auto">
           <a:xfrm>
-            <a:off x="1828800" y="2971800"/>
+            <a:off x="3352800" y="2971801"/>
             <a:ext cx="5181600" cy="3100801"/>
           </a:xfrm>
           <a:prstGeom prst="rect">
@@ -7394,621 +7366,6 @@
 </p:sld>
 </file>
 
-<file path=ppt/slides/slide25.xml><?xml version="1.0" encoding="utf-8"?>
-<p:sld xmlns:a="http://schemas.openxmlformats.org/drawingml/2006/main" xmlns:r="http://schemas.openxmlformats.org/officeDocument/2006/relationships" xmlns:p="http://schemas.openxmlformats.org/presentationml/2006/main">
-  <p:cSld>
-    <p:spTree>
-      <p:nvGrpSpPr>
-        <p:cNvPr id="1" name=""/>
-        <p:cNvGrpSpPr/>
-        <p:nvPr/>
-      </p:nvGrpSpPr>
-      <p:grpSpPr>
-        <a:xfrm>
-          <a:off x="0" y="0"/>
-          <a:ext cx="0" cy="0"/>
-          <a:chOff x="0" y="0"/>
-          <a:chExt cx="0" cy="0"/>
-        </a:xfrm>
-      </p:grpSpPr>
-      <p:sp>
-        <p:nvSpPr>
-          <p:cNvPr id="5" name="Title 4"/>
-          <p:cNvSpPr>
-            <a:spLocks noGrp="1"/>
-          </p:cNvSpPr>
-          <p:nvPr>
-            <p:ph type="title"/>
-          </p:nvPr>
-        </p:nvSpPr>
-        <p:spPr/>
-        <p:txBody>
-          <a:bodyPr/>
-          <a:lstStyle/>
-          <a:p>
-            <a:r>
-              <a:rPr lang="en-US"/>
-              <a:t>Reductions</a:t>
-            </a:r>
-            <a:endParaRPr lang="en-US" dirty="0"/>
-          </a:p>
-        </p:txBody>
-      </p:sp>
-      <p:sp>
-        <p:nvSpPr>
-          <p:cNvPr id="6" name="Text Placeholder 5"/>
-          <p:cNvSpPr>
-            <a:spLocks noGrp="1"/>
-          </p:cNvSpPr>
-          <p:nvPr>
-            <p:ph type="body" idx="1"/>
-          </p:nvPr>
-        </p:nvSpPr>
-        <p:spPr/>
-        <p:txBody>
-          <a:bodyPr/>
-          <a:lstStyle/>
-          <a:p>
-            <a:endParaRPr lang="en-US"/>
-          </a:p>
-        </p:txBody>
-      </p:sp>
-      <p:sp>
-        <p:nvSpPr>
-          <p:cNvPr id="4" name="Slide Number Placeholder 3"/>
-          <p:cNvSpPr>
-            <a:spLocks noGrp="1"/>
-          </p:cNvSpPr>
-          <p:nvPr>
-            <p:ph type="sldNum" sz="quarter" idx="12"/>
-          </p:nvPr>
-        </p:nvSpPr>
-        <p:spPr/>
-        <p:txBody>
-          <a:bodyPr/>
-          <a:lstStyle/>
-          <a:p>
-            <a:fld id="{030EE116-056E-4288-B7F7-411CB7E437A9}" type="slidenum">
-              <a:rPr lang="en-US" smtClean="0"/>
-              <a:pPr/>
-              <a:t>25</a:t>
-            </a:fld>
-            <a:endParaRPr lang="en-US"/>
-          </a:p>
-        </p:txBody>
-      </p:sp>
-    </p:spTree>
-  </p:cSld>
-  <p:clrMapOvr>
-    <a:masterClrMapping/>
-  </p:clrMapOvr>
-</p:sld>
-</file>
-
-<file path=ppt/slides/slide26.xml><?xml version="1.0" encoding="utf-8"?>
-<p:sld xmlns:a="http://schemas.openxmlformats.org/drawingml/2006/main" xmlns:r="http://schemas.openxmlformats.org/officeDocument/2006/relationships" xmlns:p="http://schemas.openxmlformats.org/presentationml/2006/main">
-  <p:cSld>
-    <p:spTree>
-      <p:nvGrpSpPr>
-        <p:cNvPr id="1" name=""/>
-        <p:cNvGrpSpPr/>
-        <p:nvPr/>
-      </p:nvGrpSpPr>
-      <p:grpSpPr>
-        <a:xfrm>
-          <a:off x="0" y="0"/>
-          <a:ext cx="0" cy="0"/>
-          <a:chOff x="0" y="0"/>
-          <a:chExt cx="0" cy="0"/>
-        </a:xfrm>
-      </p:grpSpPr>
-      <p:sp>
-        <p:nvSpPr>
-          <p:cNvPr id="2" name="Title 1"/>
-          <p:cNvSpPr>
-            <a:spLocks noGrp="1"/>
-          </p:cNvSpPr>
-          <p:nvPr>
-            <p:ph type="title"/>
-          </p:nvPr>
-        </p:nvSpPr>
-        <p:spPr/>
-        <p:txBody>
-          <a:bodyPr>
-            <a:normAutofit/>
-          </a:bodyPr>
-          <a:lstStyle/>
-          <a:p>
-            <a:r>
-              <a:rPr lang="en-US"/>
-              <a:t>Algorithm for min-cut</a:t>
-            </a:r>
-            <a:endParaRPr lang="en-US" dirty="0"/>
-          </a:p>
-        </p:txBody>
-      </p:sp>
-      <p:sp>
-        <p:nvSpPr>
-          <p:cNvPr id="4" name="Slide Number Placeholder 3"/>
-          <p:cNvSpPr>
-            <a:spLocks noGrp="1"/>
-          </p:cNvSpPr>
-          <p:nvPr>
-            <p:ph type="sldNum" sz="quarter" idx="12"/>
-          </p:nvPr>
-        </p:nvSpPr>
-        <p:spPr/>
-        <p:txBody>
-          <a:bodyPr/>
-          <a:lstStyle/>
-          <a:p>
-            <a:fld id="{030EE116-056E-4288-B7F7-411CB7E437A9}" type="slidenum">
-              <a:rPr lang="en-US" smtClean="0"/>
-              <a:pPr/>
-              <a:t>26</a:t>
-            </a:fld>
-            <a:endParaRPr lang="en-US"/>
-          </a:p>
-        </p:txBody>
-      </p:sp>
-      <p:sp>
-        <p:nvSpPr>
-          <p:cNvPr id="3" name="Content Placeholder 2"/>
-          <p:cNvSpPr>
-            <a:spLocks noGrp="1"/>
-          </p:cNvSpPr>
-          <p:nvPr>
-            <p:ph sz="quarter" idx="1"/>
-          </p:nvPr>
-        </p:nvSpPr>
-        <p:spPr/>
-        <p:txBody>
-          <a:bodyPr/>
-          <a:lstStyle/>
-          <a:p>
-            <a:r>
-              <a:rPr lang="en-US"/>
-              <a:t>Imagine that I presented you with a new algorithm to determine min-cut</a:t>
-            </a:r>
-          </a:p>
-          <a:p>
-            <a:pPr lvl="1"/>
-            <a:r>
-              <a:rPr lang="en-US"/>
-              <a:t>Everybody uses max-flow to determine min-cut, but imagine it anyway</a:t>
-            </a:r>
-          </a:p>
-          <a:p>
-            <a:endParaRPr lang="en-US"/>
-          </a:p>
-          <a:p>
-            <a:r>
-              <a:rPr lang="en-US"/>
-              <a:t>What could you tell me about that algorithm?</a:t>
-            </a:r>
-          </a:p>
-          <a:p>
-            <a:pPr lvl="1"/>
-            <a:r>
-              <a:rPr lang="en-US"/>
-              <a:t>About it’s running time?</a:t>
-            </a:r>
-            <a:endParaRPr lang="en-US" dirty="0"/>
-          </a:p>
-        </p:txBody>
-      </p:sp>
-    </p:spTree>
-  </p:cSld>
-  <p:clrMapOvr>
-    <a:masterClrMapping/>
-  </p:clrMapOvr>
-</p:sld>
-</file>
-
-<file path=ppt/slides/slide27.xml><?xml version="1.0" encoding="utf-8"?>
-<p:sld xmlns:a="http://schemas.openxmlformats.org/drawingml/2006/main" xmlns:r="http://schemas.openxmlformats.org/officeDocument/2006/relationships" xmlns:p="http://schemas.openxmlformats.org/presentationml/2006/main">
-  <p:cSld>
-    <p:spTree>
-      <p:nvGrpSpPr>
-        <p:cNvPr id="1" name=""/>
-        <p:cNvGrpSpPr/>
-        <p:nvPr/>
-      </p:nvGrpSpPr>
-      <p:grpSpPr>
-        <a:xfrm>
-          <a:off x="0" y="0"/>
-          <a:ext cx="0" cy="0"/>
-          <a:chOff x="0" y="0"/>
-          <a:chExt cx="0" cy="0"/>
-        </a:xfrm>
-      </p:grpSpPr>
-      <p:sp>
-        <p:nvSpPr>
-          <p:cNvPr id="2" name="Title 1"/>
-          <p:cNvSpPr>
-            <a:spLocks noGrp="1"/>
-          </p:cNvSpPr>
-          <p:nvPr>
-            <p:ph type="title"/>
-          </p:nvPr>
-        </p:nvSpPr>
-        <p:spPr/>
-        <p:txBody>
-          <a:bodyPr/>
-          <a:lstStyle/>
-          <a:p>
-            <a:r>
-              <a:rPr lang="en-US"/>
-              <a:t>Max-flow vs. min-cut</a:t>
-            </a:r>
-            <a:endParaRPr lang="en-US" dirty="0"/>
-          </a:p>
-        </p:txBody>
-      </p:sp>
-      <p:sp>
-        <p:nvSpPr>
-          <p:cNvPr id="4" name="Slide Number Placeholder 3"/>
-          <p:cNvSpPr>
-            <a:spLocks noGrp="1"/>
-          </p:cNvSpPr>
-          <p:nvPr>
-            <p:ph type="sldNum" sz="quarter" idx="12"/>
-          </p:nvPr>
-        </p:nvSpPr>
-        <p:spPr/>
-        <p:txBody>
-          <a:bodyPr/>
-          <a:lstStyle/>
-          <a:p>
-            <a:fld id="{030EE116-056E-4288-B7F7-411CB7E437A9}" type="slidenum">
-              <a:rPr lang="en-US" smtClean="0"/>
-              <a:pPr/>
-              <a:t>27</a:t>
-            </a:fld>
-            <a:endParaRPr lang="en-US"/>
-          </a:p>
-        </p:txBody>
-      </p:sp>
-      <p:sp>
-        <p:nvSpPr>
-          <p:cNvPr id="3" name="Content Placeholder 2"/>
-          <p:cNvSpPr>
-            <a:spLocks noGrp="1"/>
-          </p:cNvSpPr>
-          <p:nvPr>
-            <p:ph sz="quarter" idx="1"/>
-          </p:nvPr>
-        </p:nvSpPr>
-        <p:spPr/>
-        <p:txBody>
-          <a:bodyPr/>
-          <a:lstStyle/>
-          <a:p>
-            <a:r>
-              <a:rPr lang="en-US"/>
-              <a:t>These two problems are “equivalent”</a:t>
-            </a:r>
-          </a:p>
-          <a:p>
-            <a:pPr lvl="1"/>
-            <a:r>
-              <a:rPr lang="en-US"/>
-              <a:t>Specifically, if you can solve one, you can solve the other</a:t>
-            </a:r>
-          </a:p>
-          <a:p>
-            <a:r>
-              <a:rPr lang="en-US"/>
-              <a:t>Alternatively, we can say that one problem </a:t>
-            </a:r>
-            <a:r>
-              <a:rPr lang="en-US" i="1"/>
-              <a:t>reduces</a:t>
-            </a:r>
-            <a:r>
-              <a:rPr lang="en-US"/>
-              <a:t> to the other</a:t>
-            </a:r>
-          </a:p>
-          <a:p>
-            <a:pPr lvl="1"/>
-            <a:r>
-              <a:rPr lang="en-US"/>
-              <a:t>The problem of finding min-cut reduces to the problem of finding max-flow (plus a polynomial time conversion)</a:t>
-            </a:r>
-          </a:p>
-          <a:p>
-            <a:pPr lvl="1"/>
-            <a:endParaRPr lang="en-US" dirty="0"/>
-          </a:p>
-        </p:txBody>
-      </p:sp>
-    </p:spTree>
-  </p:cSld>
-  <p:clrMapOvr>
-    <a:masterClrMapping/>
-  </p:clrMapOvr>
-</p:sld>
-</file>
-
-<file path=ppt/slides/slide28.xml><?xml version="1.0" encoding="utf-8"?>
-<p:sld xmlns:a="http://schemas.openxmlformats.org/drawingml/2006/main" xmlns:r="http://schemas.openxmlformats.org/officeDocument/2006/relationships" xmlns:p="http://schemas.openxmlformats.org/presentationml/2006/main">
-  <p:cSld>
-    <p:spTree>
-      <p:nvGrpSpPr>
-        <p:cNvPr id="1" name=""/>
-        <p:cNvGrpSpPr/>
-        <p:nvPr/>
-      </p:nvGrpSpPr>
-      <p:grpSpPr>
-        <a:xfrm>
-          <a:off x="0" y="0"/>
-          <a:ext cx="0" cy="0"/>
-          <a:chOff x="0" y="0"/>
-          <a:chExt cx="0" cy="0"/>
-        </a:xfrm>
-      </p:grpSpPr>
-      <p:sp>
-        <p:nvSpPr>
-          <p:cNvPr id="2" name="Title 1"/>
-          <p:cNvSpPr>
-            <a:spLocks noGrp="1"/>
-          </p:cNvSpPr>
-          <p:nvPr>
-            <p:ph type="title"/>
-          </p:nvPr>
-        </p:nvSpPr>
-        <p:spPr/>
-        <p:txBody>
-          <a:bodyPr/>
-          <a:lstStyle/>
-          <a:p>
-            <a:r>
-              <a:rPr lang="en-US"/>
-              <a:t>Reduction</a:t>
-            </a:r>
-            <a:endParaRPr lang="en-US" dirty="0"/>
-          </a:p>
-        </p:txBody>
-      </p:sp>
-      <p:sp>
-        <p:nvSpPr>
-          <p:cNvPr id="4" name="Slide Number Placeholder 3"/>
-          <p:cNvSpPr>
-            <a:spLocks noGrp="1"/>
-          </p:cNvSpPr>
-          <p:nvPr>
-            <p:ph type="sldNum" sz="quarter" idx="12"/>
-          </p:nvPr>
-        </p:nvSpPr>
-        <p:spPr/>
-        <p:txBody>
-          <a:bodyPr/>
-          <a:lstStyle/>
-          <a:p>
-            <a:fld id="{030EE116-056E-4288-B7F7-411CB7E437A9}" type="slidenum">
-              <a:rPr lang="en-US" smtClean="0"/>
-              <a:pPr/>
-              <a:t>28</a:t>
-            </a:fld>
-            <a:endParaRPr lang="en-US"/>
-          </a:p>
-        </p:txBody>
-      </p:sp>
-      <p:sp>
-        <p:nvSpPr>
-          <p:cNvPr id="3" name="Content Placeholder 2"/>
-          <p:cNvSpPr>
-            <a:spLocks noGrp="1"/>
-          </p:cNvSpPr>
-          <p:nvPr>
-            <p:ph sz="quarter" idx="1"/>
-          </p:nvPr>
-        </p:nvSpPr>
-        <p:spPr/>
-        <p:txBody>
-          <a:bodyPr>
-            <a:normAutofit/>
-          </a:bodyPr>
-          <a:lstStyle/>
-          <a:p>
-            <a:r>
-              <a:rPr lang="en-US"/>
-              <a:t>A reduction is a transformation of one problem into another problem</a:t>
-            </a:r>
-          </a:p>
-          <a:p>
-            <a:pPr lvl="1"/>
-            <a:r>
-              <a:rPr lang="en-US"/>
-              <a:t>Min-cut is reducible to max-flow because we can use max-flow to solve min-cut</a:t>
-            </a:r>
-          </a:p>
-          <a:p>
-            <a:pPr lvl="1"/>
-            <a:r>
-              <a:rPr lang="en-US"/>
-              <a:t>Formally, problem A is reducible to problem B if we can use a solution to B to solve A</a:t>
-            </a:r>
-          </a:p>
-          <a:p>
-            <a:r>
-              <a:rPr lang="en-US"/>
-              <a:t>We note that the reduction happens in polynomial time</a:t>
-            </a:r>
-          </a:p>
-          <a:p>
-            <a:r>
-              <a:rPr lang="en-US"/>
-              <a:t>And signify it with a ≤</a:t>
-            </a:r>
-            <a:r>
-              <a:rPr lang="en-US" baseline="-25000"/>
-              <a:t>p</a:t>
-            </a:r>
-            <a:r>
-              <a:rPr lang="en-US"/>
-              <a:t> </a:t>
-            </a:r>
-            <a:endParaRPr lang="en-US" dirty="0"/>
-          </a:p>
-        </p:txBody>
-      </p:sp>
-    </p:spTree>
-  </p:cSld>
-  <p:clrMapOvr>
-    <a:masterClrMapping/>
-  </p:clrMapOvr>
-</p:sld>
-</file>
-
-<file path=ppt/slides/slide29.xml><?xml version="1.0" encoding="utf-8"?>
-<p:sld xmlns:a="http://schemas.openxmlformats.org/drawingml/2006/main" xmlns:r="http://schemas.openxmlformats.org/officeDocument/2006/relationships" xmlns:p="http://schemas.openxmlformats.org/presentationml/2006/main">
-  <p:cSld>
-    <p:spTree>
-      <p:nvGrpSpPr>
-        <p:cNvPr id="1" name=""/>
-        <p:cNvGrpSpPr/>
-        <p:nvPr/>
-      </p:nvGrpSpPr>
-      <p:grpSpPr>
-        <a:xfrm>
-          <a:off x="0" y="0"/>
-          <a:ext cx="0" cy="0"/>
-          <a:chOff x="0" y="0"/>
-          <a:chExt cx="0" cy="0"/>
-        </a:xfrm>
-      </p:grpSpPr>
-      <p:sp>
-        <p:nvSpPr>
-          <p:cNvPr id="2" name="Title 1"/>
-          <p:cNvSpPr>
-            <a:spLocks noGrp="1"/>
-          </p:cNvSpPr>
-          <p:nvPr>
-            <p:ph type="title"/>
-          </p:nvPr>
-        </p:nvSpPr>
-        <p:spPr/>
-        <p:txBody>
-          <a:bodyPr/>
-          <a:lstStyle/>
-          <a:p>
-            <a:r>
-              <a:rPr lang="en-US"/>
-              <a:t>Reducing both ways</a:t>
-            </a:r>
-            <a:endParaRPr lang="en-US" dirty="0"/>
-          </a:p>
-        </p:txBody>
-      </p:sp>
-      <p:sp>
-        <p:nvSpPr>
-          <p:cNvPr id="4" name="Slide Number Placeholder 3"/>
-          <p:cNvSpPr>
-            <a:spLocks noGrp="1"/>
-          </p:cNvSpPr>
-          <p:nvPr>
-            <p:ph type="sldNum" sz="quarter" idx="12"/>
-          </p:nvPr>
-        </p:nvSpPr>
-        <p:spPr/>
-        <p:txBody>
-          <a:bodyPr/>
-          <a:lstStyle/>
-          <a:p>
-            <a:fld id="{030EE116-056E-4288-B7F7-411CB7E437A9}" type="slidenum">
-              <a:rPr lang="en-US" smtClean="0"/>
-              <a:pPr/>
-              <a:t>29</a:t>
-            </a:fld>
-            <a:endParaRPr lang="en-US"/>
-          </a:p>
-        </p:txBody>
-      </p:sp>
-      <p:sp>
-        <p:nvSpPr>
-          <p:cNvPr id="3" name="Content Placeholder 2"/>
-          <p:cNvSpPr>
-            <a:spLocks noGrp="1"/>
-          </p:cNvSpPr>
-          <p:nvPr>
-            <p:ph sz="quarter" idx="1"/>
-          </p:nvPr>
-        </p:nvSpPr>
-        <p:spPr/>
-        <p:txBody>
-          <a:bodyPr/>
-          <a:lstStyle/>
-          <a:p>
-            <a:r>
-              <a:rPr lang="en-US" dirty="0"/>
-              <a:t>We know that:</a:t>
-            </a:r>
-          </a:p>
-          <a:p>
-            <a:pPr lvl="1"/>
-            <a:r>
-              <a:rPr lang="en-US" dirty="0"/>
-              <a:t>Min-cut ≤</a:t>
-            </a:r>
-            <a:r>
-              <a:rPr lang="en-US" baseline="-25000" dirty="0"/>
-              <a:t>p</a:t>
-            </a:r>
-            <a:r>
-              <a:rPr lang="en-US" dirty="0"/>
-              <a:t> max-flow</a:t>
-            </a:r>
-          </a:p>
-          <a:p>
-            <a:pPr lvl="1"/>
-            <a:r>
-              <a:rPr lang="en-US" dirty="0"/>
-              <a:t>Max-flow ≤</a:t>
-            </a:r>
-            <a:r>
-              <a:rPr lang="en-US" baseline="-25000" dirty="0"/>
-              <a:t>p</a:t>
-            </a:r>
-            <a:r>
-              <a:rPr lang="en-US" dirty="0"/>
-              <a:t> min-cut</a:t>
-            </a:r>
-          </a:p>
-          <a:p>
-            <a:r>
-              <a:rPr lang="en-US" dirty="0"/>
-              <a:t>Because they reduce both ways, they are </a:t>
-            </a:r>
-            <a:r>
-              <a:rPr lang="en-US" i="1" dirty="0"/>
-              <a:t>polynomial-time equivalent</a:t>
-            </a:r>
-          </a:p>
-          <a:p>
-            <a:r>
-              <a:rPr lang="en-US" dirty="0"/>
-              <a:t>Often times you can’t directly compare algorithms</a:t>
-            </a:r>
-          </a:p>
-          <a:p>
-            <a:pPr lvl="1"/>
-            <a:r>
-              <a:rPr lang="en-US" dirty="0"/>
-              <a:t>So you show that they reduce both ways</a:t>
-            </a:r>
-          </a:p>
-        </p:txBody>
-      </p:sp>
-    </p:spTree>
-  </p:cSld>
-  <p:clrMapOvr>
-    <a:masterClrMapping/>
-  </p:clrMapOvr>
-</p:sld>
-</file>
-
 <file path=ppt/slides/slide3.xml><?xml version="1.0" encoding="utf-8"?>
 <p:sld xmlns:a="http://schemas.openxmlformats.org/drawingml/2006/main" xmlns:r="http://schemas.openxmlformats.org/officeDocument/2006/relationships" xmlns:p="http://schemas.openxmlformats.org/presentationml/2006/main">
   <p:cSld>
@@ -8117,1371 +7474,28 @@
           <a:p>
             <a:r>
               <a:rPr lang="en-US" dirty="0"/>
-              <a:t>Related Graph Problems</a:t>
+              <a:t>Max-Flow Min-Cut Theorem</a:t>
             </a:r>
           </a:p>
           <a:p>
             <a:pPr lvl="1"/>
             <a:r>
               <a:rPr lang="en-US" dirty="0"/>
-              <a:t>Bi-partite Matching</a:t>
+              <a:t>What is it? Why does it matter?</a:t>
             </a:r>
           </a:p>
           <a:p>
             <a:pPr lvl="1"/>
             <a:r>
               <a:rPr lang="en-US" dirty="0"/>
-              <a:t>Minimum Cut</a:t>
-            </a:r>
-          </a:p>
-          <a:p>
-            <a:r>
-              <a:rPr lang="en-US" dirty="0"/>
-              <a:t>A Short introduction to reductions</a:t>
+              <a:t>Proof!</a:t>
             </a:r>
           </a:p>
           <a:p>
             <a:pPr lvl="1"/>
             <a:r>
               <a:rPr lang="en-US" dirty="0"/>
-              <a:t>…but many more reductions coming at end of course</a:t>
-            </a:r>
-          </a:p>
-        </p:txBody>
-      </p:sp>
-    </p:spTree>
-  </p:cSld>
-  <p:clrMapOvr>
-    <a:masterClrMapping/>
-  </p:clrMapOvr>
-</p:sld>
-</file>
-
-<file path=ppt/slides/slide30.xml><?xml version="1.0" encoding="utf-8"?>
-<p:sld xmlns:a="http://schemas.openxmlformats.org/drawingml/2006/main" xmlns:r="http://schemas.openxmlformats.org/officeDocument/2006/relationships" xmlns:p="http://schemas.openxmlformats.org/presentationml/2006/main">
-  <p:cSld>
-    <p:spTree>
-      <p:nvGrpSpPr>
-        <p:cNvPr id="1" name=""/>
-        <p:cNvGrpSpPr/>
-        <p:nvPr/>
-      </p:nvGrpSpPr>
-      <p:grpSpPr>
-        <a:xfrm>
-          <a:off x="0" y="0"/>
-          <a:ext cx="0" cy="0"/>
-          <a:chOff x="0" y="0"/>
-          <a:chExt cx="0" cy="0"/>
-        </a:xfrm>
-      </p:grpSpPr>
-      <p:sp>
-        <p:nvSpPr>
-          <p:cNvPr id="5" name="Title 4"/>
-          <p:cNvSpPr>
-            <a:spLocks noGrp="1"/>
-          </p:cNvSpPr>
-          <p:nvPr>
-            <p:ph type="title"/>
-          </p:nvPr>
-        </p:nvSpPr>
-        <p:spPr/>
-        <p:txBody>
-          <a:bodyPr/>
-          <a:lstStyle/>
-          <a:p>
-            <a:r>
-              <a:rPr lang="en-US"/>
-              <a:t>Bipartite Graphs</a:t>
-            </a:r>
-            <a:endParaRPr lang="en-US" dirty="0"/>
-          </a:p>
-        </p:txBody>
-      </p:sp>
-      <p:sp>
-        <p:nvSpPr>
-          <p:cNvPr id="6" name="Text Placeholder 5"/>
-          <p:cNvSpPr>
-            <a:spLocks noGrp="1"/>
-          </p:cNvSpPr>
-          <p:nvPr>
-            <p:ph type="body" idx="1"/>
-          </p:nvPr>
-        </p:nvSpPr>
-        <p:spPr/>
-        <p:txBody>
-          <a:bodyPr/>
-          <a:lstStyle/>
-          <a:p>
-            <a:endParaRPr lang="en-US"/>
-          </a:p>
-        </p:txBody>
-      </p:sp>
-      <p:sp>
-        <p:nvSpPr>
-          <p:cNvPr id="4" name="Slide Number Placeholder 3"/>
-          <p:cNvSpPr>
-            <a:spLocks noGrp="1"/>
-          </p:cNvSpPr>
-          <p:nvPr>
-            <p:ph type="sldNum" sz="quarter" idx="12"/>
-          </p:nvPr>
-        </p:nvSpPr>
-        <p:spPr/>
-        <p:txBody>
-          <a:bodyPr/>
-          <a:lstStyle/>
-          <a:p>
-            <a:fld id="{030EE116-056E-4288-B7F7-411CB7E437A9}" type="slidenum">
-              <a:rPr lang="en-US" smtClean="0"/>
-              <a:pPr/>
-              <a:t>30</a:t>
-            </a:fld>
-            <a:endParaRPr lang="en-US"/>
-          </a:p>
-        </p:txBody>
-      </p:sp>
-    </p:spTree>
-    <p:extLst>
-      <p:ext uri="{BB962C8B-B14F-4D97-AF65-F5344CB8AC3E}">
-        <p14:creationId xmlns:p14="http://schemas.microsoft.com/office/powerpoint/2010/main" val="3025052742"/>
-      </p:ext>
-    </p:extLst>
-  </p:cSld>
-  <p:clrMapOvr>
-    <a:masterClrMapping/>
-  </p:clrMapOvr>
-</p:sld>
-</file>
-
-<file path=ppt/slides/slide31.xml><?xml version="1.0" encoding="utf-8"?>
-<p:sld xmlns:a="http://schemas.openxmlformats.org/drawingml/2006/main" xmlns:r="http://schemas.openxmlformats.org/officeDocument/2006/relationships" xmlns:p="http://schemas.openxmlformats.org/presentationml/2006/main">
-  <p:cSld>
-    <p:spTree>
-      <p:nvGrpSpPr>
-        <p:cNvPr id="1" name=""/>
-        <p:cNvGrpSpPr/>
-        <p:nvPr/>
-      </p:nvGrpSpPr>
-      <p:grpSpPr>
-        <a:xfrm>
-          <a:off x="0" y="0"/>
-          <a:ext cx="0" cy="0"/>
-          <a:chOff x="0" y="0"/>
-          <a:chExt cx="0" cy="0"/>
-        </a:xfrm>
-      </p:grpSpPr>
-      <p:sp>
-        <p:nvSpPr>
-          <p:cNvPr id="5" name="Title 4"/>
-          <p:cNvSpPr>
-            <a:spLocks noGrp="1"/>
-          </p:cNvSpPr>
-          <p:nvPr>
-            <p:ph type="title"/>
-          </p:nvPr>
-        </p:nvSpPr>
-        <p:spPr/>
-        <p:txBody>
-          <a:bodyPr/>
-          <a:lstStyle/>
-          <a:p>
-            <a:r>
-              <a:rPr lang="en-US"/>
-              <a:t>Bipartite Graphs</a:t>
-            </a:r>
-            <a:endParaRPr lang="en-US" dirty="0"/>
-          </a:p>
-        </p:txBody>
-      </p:sp>
-      <p:sp>
-        <p:nvSpPr>
-          <p:cNvPr id="4" name="Slide Number Placeholder 3"/>
-          <p:cNvSpPr>
-            <a:spLocks noGrp="1"/>
-          </p:cNvSpPr>
-          <p:nvPr>
-            <p:ph type="sldNum" sz="quarter" idx="12"/>
-          </p:nvPr>
-        </p:nvSpPr>
-        <p:spPr/>
-        <p:txBody>
-          <a:bodyPr/>
-          <a:lstStyle/>
-          <a:p>
-            <a:fld id="{030EE116-056E-4288-B7F7-411CB7E437A9}" type="slidenum">
-              <a:rPr lang="en-US" smtClean="0"/>
-              <a:pPr/>
-              <a:t>31</a:t>
-            </a:fld>
-            <a:endParaRPr lang="en-US"/>
-          </a:p>
-        </p:txBody>
-      </p:sp>
-      <p:sp>
-        <p:nvSpPr>
-          <p:cNvPr id="6" name="Content Placeholder 5"/>
-          <p:cNvSpPr>
-            <a:spLocks noGrp="1"/>
-          </p:cNvSpPr>
-          <p:nvPr>
-            <p:ph sz="quarter" idx="1"/>
-          </p:nvPr>
-        </p:nvSpPr>
-        <p:spPr/>
-        <p:txBody>
-          <a:bodyPr/>
-          <a:lstStyle/>
-          <a:p>
-            <a:r>
-              <a:rPr lang="en-US"/>
-              <a:t>A graph is </a:t>
-            </a:r>
-            <a:r>
-              <a:rPr lang="en-US" i="1"/>
-              <a:t>bipartite</a:t>
-            </a:r>
-            <a:r>
-              <a:rPr lang="en-US"/>
-              <a:t> if node set V can be split into sets X and Y such that every edge has one end in X and one end in Y</a:t>
-            </a:r>
-          </a:p>
-          <a:p>
-            <a:pPr lvl="1"/>
-            <a:r>
-              <a:rPr lang="en-US"/>
-              <a:t>X and Y are typically colored red and blue</a:t>
-            </a:r>
-          </a:p>
-          <a:p>
-            <a:pPr lvl="2"/>
-            <a:r>
-              <a:rPr lang="en-US"/>
-              <a:t>Or Boolean true/false</a:t>
-            </a:r>
-            <a:endParaRPr lang="en-US" dirty="0"/>
-          </a:p>
-        </p:txBody>
-      </p:sp>
-      <p:pic>
-        <p:nvPicPr>
-          <p:cNvPr id="7" name="Picture 6" descr="RecursiveEvenBipartite.png"/>
-          <p:cNvPicPr>
-            <a:picLocks noChangeAspect="1"/>
-          </p:cNvPicPr>
-          <p:nvPr/>
-        </p:nvPicPr>
-        <p:blipFill>
-          <a:blip r:embed="rId2">
-            <a:clrChange>
-              <a:clrFrom>
-                <a:srgbClr val="FFFFFF"/>
-              </a:clrFrom>
-              <a:clrTo>
-                <a:srgbClr val="FFFFFF">
-                  <a:alpha val="0"/>
-                </a:srgbClr>
-              </a:clrTo>
-            </a:clrChange>
-          </a:blip>
-          <a:stretch>
-            <a:fillRect/>
-          </a:stretch>
-        </p:blipFill>
-        <p:spPr>
-          <a:xfrm>
-            <a:off x="1600199" y="3962400"/>
-            <a:ext cx="5343525" cy="2514600"/>
-          </a:xfrm>
-          <a:prstGeom prst="rect">
-            <a:avLst/>
-          </a:prstGeom>
-        </p:spPr>
-      </p:pic>
-    </p:spTree>
-    <p:extLst>
-      <p:ext uri="{BB962C8B-B14F-4D97-AF65-F5344CB8AC3E}">
-        <p14:creationId xmlns:p14="http://schemas.microsoft.com/office/powerpoint/2010/main" val="599263942"/>
-      </p:ext>
-    </p:extLst>
-  </p:cSld>
-  <p:clrMapOvr>
-    <a:masterClrMapping/>
-  </p:clrMapOvr>
-</p:sld>
-</file>
-
-<file path=ppt/slides/slide32.xml><?xml version="1.0" encoding="utf-8"?>
-<p:sld xmlns:a="http://schemas.openxmlformats.org/drawingml/2006/main" xmlns:r="http://schemas.openxmlformats.org/officeDocument/2006/relationships" xmlns:p="http://schemas.openxmlformats.org/presentationml/2006/main">
-  <p:cSld>
-    <p:spTree>
-      <p:nvGrpSpPr>
-        <p:cNvPr id="1" name=""/>
-        <p:cNvGrpSpPr/>
-        <p:nvPr/>
-      </p:nvGrpSpPr>
-      <p:grpSpPr>
-        <a:xfrm>
-          <a:off x="0" y="0"/>
-          <a:ext cx="0" cy="0"/>
-          <a:chOff x="0" y="0"/>
-          <a:chExt cx="0" cy="0"/>
-        </a:xfrm>
-      </p:grpSpPr>
-      <p:sp>
-        <p:nvSpPr>
-          <p:cNvPr id="2" name="Title 1"/>
-          <p:cNvSpPr>
-            <a:spLocks noGrp="1"/>
-          </p:cNvSpPr>
-          <p:nvPr>
-            <p:ph type="title"/>
-          </p:nvPr>
-        </p:nvSpPr>
-        <p:spPr/>
-        <p:txBody>
-          <a:bodyPr/>
-          <a:lstStyle/>
-          <a:p>
-            <a:r>
-              <a:rPr lang="en-US"/>
-              <a:t>Notes and assumptions</a:t>
-            </a:r>
-            <a:endParaRPr lang="en-US" dirty="0"/>
-          </a:p>
-        </p:txBody>
-      </p:sp>
-      <p:sp>
-        <p:nvSpPr>
-          <p:cNvPr id="4" name="Slide Number Placeholder 3"/>
-          <p:cNvSpPr>
-            <a:spLocks noGrp="1"/>
-          </p:cNvSpPr>
-          <p:nvPr>
-            <p:ph type="sldNum" sz="quarter" idx="12"/>
-          </p:nvPr>
-        </p:nvSpPr>
-        <p:spPr/>
-        <p:txBody>
-          <a:bodyPr/>
-          <a:lstStyle/>
-          <a:p>
-            <a:fld id="{030EE116-056E-4288-B7F7-411CB7E437A9}" type="slidenum">
-              <a:rPr lang="en-US" smtClean="0"/>
-              <a:pPr/>
-              <a:t>32</a:t>
-            </a:fld>
-            <a:endParaRPr lang="en-US"/>
-          </a:p>
-        </p:txBody>
-      </p:sp>
-      <p:sp>
-        <p:nvSpPr>
-          <p:cNvPr id="3" name="Content Placeholder 2"/>
-          <p:cNvSpPr>
-            <a:spLocks noGrp="1"/>
-          </p:cNvSpPr>
-          <p:nvPr>
-            <p:ph sz="quarter" idx="1"/>
-          </p:nvPr>
-        </p:nvSpPr>
-        <p:spPr/>
-        <p:txBody>
-          <a:bodyPr/>
-          <a:lstStyle/>
-          <a:p>
-            <a:r>
-              <a:rPr lang="en-US" dirty="0"/>
-              <a:t>We assume the graph is connected</a:t>
-            </a:r>
-          </a:p>
-          <a:p>
-            <a:pPr lvl="1"/>
-            <a:r>
-              <a:rPr lang="en-US" dirty="0"/>
-              <a:t>Otherwise we will only look at each connected component individually</a:t>
-            </a:r>
-          </a:p>
-          <a:p>
-            <a:r>
-              <a:rPr lang="en-US" dirty="0"/>
-              <a:t>A triangle cannot be bipartite</a:t>
-            </a:r>
-          </a:p>
-          <a:p>
-            <a:pPr lvl="1" algn="l"/>
-            <a:r>
-              <a:rPr lang="en-US" dirty="0"/>
-              <a:t>In fact, any graph with an odd </a:t>
-            </a:r>
-            <a:br>
-              <a:rPr lang="en-US" dirty="0"/>
-            </a:br>
-            <a:r>
-              <a:rPr lang="en-US" dirty="0"/>
-              <a:t>length cycle cannot be bipartite</a:t>
-            </a:r>
-          </a:p>
-        </p:txBody>
-      </p:sp>
-      <p:pic>
-        <p:nvPicPr>
-          <p:cNvPr id="5" name="Picture 2" descr="C:\WINDOWS\Desktop\Oh_type\kleinberg_GIF_01to10\kleinberg_07F09.gif"/>
-          <p:cNvPicPr preferRelativeResize="0">
-            <a:picLocks noChangeAspect="1" noChangeArrowheads="1"/>
-          </p:cNvPicPr>
-          <p:nvPr>
-            <p:custDataLst>
-              <p:tags r:id="rId1"/>
-            </p:custDataLst>
-          </p:nvPr>
-        </p:nvPicPr>
-        <p:blipFill>
-          <a:blip r:embed="rId3">
-            <a:clrChange>
-              <a:clrFrom>
-                <a:srgbClr val="FFFFFF"/>
-              </a:clrFrom>
-              <a:clrTo>
-                <a:srgbClr val="FFFFFF">
-                  <a:alpha val="0"/>
-                </a:srgbClr>
-              </a:clrTo>
-            </a:clrChange>
-          </a:blip>
-          <a:srcRect l="7189" t="2029" r="67321" b="28994"/>
-          <a:stretch>
-            <a:fillRect/>
-          </a:stretch>
-        </p:blipFill>
-        <p:spPr bwMode="auto">
-          <a:xfrm>
-            <a:off x="6019800" y="2836985"/>
-            <a:ext cx="2667000" cy="3487615"/>
-          </a:xfrm>
-          <a:prstGeom prst="rect">
-            <a:avLst/>
-          </a:prstGeom>
-          <a:noFill/>
-          <a:ln w="9525">
-            <a:noFill/>
-            <a:miter lim="800000"/>
-            <a:headEnd/>
-            <a:tailEnd/>
-          </a:ln>
-          <a:effectLst/>
-        </p:spPr>
-      </p:pic>
-    </p:spTree>
-    <p:extLst>
-      <p:ext uri="{BB962C8B-B14F-4D97-AF65-F5344CB8AC3E}">
-        <p14:creationId xmlns:p14="http://schemas.microsoft.com/office/powerpoint/2010/main" val="646681337"/>
-      </p:ext>
-    </p:extLst>
-  </p:cSld>
-  <p:clrMapOvr>
-    <a:masterClrMapping/>
-  </p:clrMapOvr>
-</p:sld>
-</file>
-
-<file path=ppt/slides/slide33.xml><?xml version="1.0" encoding="utf-8"?>
-<p:sld xmlns:a="http://schemas.openxmlformats.org/drawingml/2006/main" xmlns:r="http://schemas.openxmlformats.org/officeDocument/2006/relationships" xmlns:p="http://schemas.openxmlformats.org/presentationml/2006/main">
-  <p:cSld>
-    <p:spTree>
-      <p:nvGrpSpPr>
-        <p:cNvPr id="1" name=""/>
-        <p:cNvGrpSpPr/>
-        <p:nvPr/>
-      </p:nvGrpSpPr>
-      <p:grpSpPr>
-        <a:xfrm>
-          <a:off x="0" y="0"/>
-          <a:ext cx="0" cy="0"/>
-          <a:chOff x="0" y="0"/>
-          <a:chExt cx="0" cy="0"/>
-        </a:xfrm>
-      </p:grpSpPr>
-      <p:sp>
-        <p:nvSpPr>
-          <p:cNvPr id="2" name="Title 1"/>
-          <p:cNvSpPr>
-            <a:spLocks noGrp="1"/>
-          </p:cNvSpPr>
-          <p:nvPr>
-            <p:ph type="title"/>
-          </p:nvPr>
-        </p:nvSpPr>
-        <p:spPr/>
-        <p:txBody>
-          <a:bodyPr/>
-          <a:lstStyle/>
-          <a:p>
-            <a:r>
-              <a:rPr lang="en-US"/>
-              <a:t>Bipartite Determination Algorithm </a:t>
-            </a:r>
-            <a:endParaRPr lang="en-US" dirty="0"/>
-          </a:p>
-        </p:txBody>
-      </p:sp>
-      <p:sp>
-        <p:nvSpPr>
-          <p:cNvPr id="4" name="Slide Number Placeholder 3"/>
-          <p:cNvSpPr>
-            <a:spLocks noGrp="1"/>
-          </p:cNvSpPr>
-          <p:nvPr>
-            <p:ph type="sldNum" sz="quarter" idx="12"/>
-          </p:nvPr>
-        </p:nvSpPr>
-        <p:spPr/>
-        <p:txBody>
-          <a:bodyPr/>
-          <a:lstStyle/>
-          <a:p>
-            <a:fld id="{030EE116-056E-4288-B7F7-411CB7E437A9}" type="slidenum">
-              <a:rPr lang="en-US" smtClean="0"/>
-              <a:pPr/>
-              <a:t>33</a:t>
-            </a:fld>
-            <a:endParaRPr lang="en-US"/>
-          </a:p>
-        </p:txBody>
-      </p:sp>
-      <p:sp>
-        <p:nvSpPr>
-          <p:cNvPr id="3" name="Content Placeholder 2"/>
-          <p:cNvSpPr>
-            <a:spLocks noGrp="1"/>
-          </p:cNvSpPr>
-          <p:nvPr>
-            <p:ph sz="quarter" idx="1"/>
-          </p:nvPr>
-        </p:nvSpPr>
-        <p:spPr/>
-        <p:txBody>
-          <a:bodyPr/>
-          <a:lstStyle/>
-          <a:p>
-            <a:r>
-              <a:rPr lang="en-US"/>
-              <a:t>Pick a starting vertex, color it red</a:t>
-            </a:r>
-          </a:p>
-          <a:p>
-            <a:r>
-              <a:rPr lang="en-US"/>
-              <a:t>Color all adjacent nodes blue</a:t>
-            </a:r>
-          </a:p>
-          <a:p>
-            <a:pPr lvl="1"/>
-            <a:r>
-              <a:rPr lang="en-US"/>
-              <a:t>And all nodes adjacent to that red</a:t>
-            </a:r>
-          </a:p>
-          <a:p>
-            <a:pPr lvl="1"/>
-            <a:r>
-              <a:rPr lang="en-US"/>
-              <a:t>Etc.</a:t>
-            </a:r>
-          </a:p>
-          <a:p>
-            <a:r>
-              <a:rPr lang="en-US"/>
-              <a:t>If you ever try coloring a red node blue, or a blue node red, then the graph is not bipartite</a:t>
-            </a:r>
-          </a:p>
-          <a:p>
-            <a:endParaRPr lang="en-US"/>
-          </a:p>
-          <a:p>
-            <a:r>
-              <a:rPr lang="en-US"/>
-              <a:t>Does this algorithm sound familiar?</a:t>
-            </a:r>
-            <a:endParaRPr lang="en-US" dirty="0"/>
-          </a:p>
-        </p:txBody>
-      </p:sp>
-    </p:spTree>
-    <p:extLst>
-      <p:ext uri="{BB962C8B-B14F-4D97-AF65-F5344CB8AC3E}">
-        <p14:creationId xmlns:p14="http://schemas.microsoft.com/office/powerpoint/2010/main" val="1338392378"/>
-      </p:ext>
-    </p:extLst>
-  </p:cSld>
-  <p:clrMapOvr>
-    <a:masterClrMapping/>
-  </p:clrMapOvr>
-</p:sld>
-</file>
-
-<file path=ppt/slides/slide34.xml><?xml version="1.0" encoding="utf-8"?>
-<p:sld xmlns:a="http://schemas.openxmlformats.org/drawingml/2006/main" xmlns:r="http://schemas.openxmlformats.org/officeDocument/2006/relationships" xmlns:p="http://schemas.openxmlformats.org/presentationml/2006/main">
-  <p:cSld>
-    <p:spTree>
-      <p:nvGrpSpPr>
-        <p:cNvPr id="1" name=""/>
-        <p:cNvGrpSpPr/>
-        <p:nvPr/>
-      </p:nvGrpSpPr>
-      <p:grpSpPr>
-        <a:xfrm>
-          <a:off x="0" y="0"/>
-          <a:ext cx="0" cy="0"/>
-          <a:chOff x="0" y="0"/>
-          <a:chExt cx="0" cy="0"/>
-        </a:xfrm>
-      </p:grpSpPr>
-      <p:sp>
-        <p:nvSpPr>
-          <p:cNvPr id="5" name="Title 4"/>
-          <p:cNvSpPr>
-            <a:spLocks noGrp="1"/>
-          </p:cNvSpPr>
-          <p:nvPr>
-            <p:ph type="title"/>
-          </p:nvPr>
-        </p:nvSpPr>
-        <p:spPr/>
-        <p:txBody>
-          <a:bodyPr/>
-          <a:lstStyle/>
-          <a:p>
-            <a:r>
-              <a:rPr lang="en-US"/>
-              <a:t>Bipartite Matching</a:t>
-            </a:r>
-            <a:endParaRPr lang="en-US" dirty="0"/>
-          </a:p>
-        </p:txBody>
-      </p:sp>
-      <p:sp>
-        <p:nvSpPr>
-          <p:cNvPr id="6" name="Text Placeholder 5"/>
-          <p:cNvSpPr>
-            <a:spLocks noGrp="1"/>
-          </p:cNvSpPr>
-          <p:nvPr>
-            <p:ph type="body" idx="1"/>
-          </p:nvPr>
-        </p:nvSpPr>
-        <p:spPr/>
-        <p:txBody>
-          <a:bodyPr/>
-          <a:lstStyle/>
-          <a:p>
-            <a:endParaRPr lang="en-US"/>
-          </a:p>
-        </p:txBody>
-      </p:sp>
-      <p:sp>
-        <p:nvSpPr>
-          <p:cNvPr id="4" name="Slide Number Placeholder 3"/>
-          <p:cNvSpPr>
-            <a:spLocks noGrp="1"/>
-          </p:cNvSpPr>
-          <p:nvPr>
-            <p:ph type="sldNum" sz="quarter" idx="12"/>
-          </p:nvPr>
-        </p:nvSpPr>
-        <p:spPr/>
-        <p:txBody>
-          <a:bodyPr/>
-          <a:lstStyle/>
-          <a:p>
-            <a:fld id="{030EE116-056E-4288-B7F7-411CB7E437A9}" type="slidenum">
-              <a:rPr lang="en-US" smtClean="0"/>
-              <a:pPr/>
-              <a:t>34</a:t>
-            </a:fld>
-            <a:endParaRPr lang="en-US"/>
-          </a:p>
-        </p:txBody>
-      </p:sp>
-    </p:spTree>
-  </p:cSld>
-  <p:clrMapOvr>
-    <a:masterClrMapping/>
-  </p:clrMapOvr>
-</p:sld>
-</file>
-
-<file path=ppt/slides/slide35.xml><?xml version="1.0" encoding="utf-8"?>
-<p:sld xmlns:a="http://schemas.openxmlformats.org/drawingml/2006/main" xmlns:r="http://schemas.openxmlformats.org/officeDocument/2006/relationships" xmlns:p="http://schemas.openxmlformats.org/presentationml/2006/main">
-  <p:cSld>
-    <p:spTree>
-      <p:nvGrpSpPr>
-        <p:cNvPr id="1" name=""/>
-        <p:cNvGrpSpPr/>
-        <p:nvPr/>
-      </p:nvGrpSpPr>
-      <p:grpSpPr>
-        <a:xfrm>
-          <a:off x="0" y="0"/>
-          <a:ext cx="0" cy="0"/>
-          <a:chOff x="0" y="0"/>
-          <a:chExt cx="0" cy="0"/>
-        </a:xfrm>
-      </p:grpSpPr>
-      <p:sp>
-        <p:nvSpPr>
-          <p:cNvPr id="2" name="Title 1"/>
-          <p:cNvSpPr>
-            <a:spLocks noGrp="1"/>
-          </p:cNvSpPr>
-          <p:nvPr>
-            <p:ph type="title"/>
-          </p:nvPr>
-        </p:nvSpPr>
-        <p:spPr/>
-        <p:txBody>
-          <a:bodyPr/>
-          <a:lstStyle/>
-          <a:p>
-            <a:r>
-              <a:rPr lang="en-US"/>
-              <a:t>Bipartite Matching</a:t>
-            </a:r>
-            <a:endParaRPr lang="en-US" dirty="0"/>
-          </a:p>
-        </p:txBody>
-      </p:sp>
-      <p:sp>
-        <p:nvSpPr>
-          <p:cNvPr id="4" name="Slide Number Placeholder 3"/>
-          <p:cNvSpPr>
-            <a:spLocks noGrp="1"/>
-          </p:cNvSpPr>
-          <p:nvPr>
-            <p:ph type="sldNum" sz="quarter" idx="12"/>
-          </p:nvPr>
-        </p:nvSpPr>
-        <p:spPr/>
-        <p:txBody>
-          <a:bodyPr/>
-          <a:lstStyle/>
-          <a:p>
-            <a:fld id="{030EE116-056E-4288-B7F7-411CB7E437A9}" type="slidenum">
-              <a:rPr lang="en-US" smtClean="0"/>
-              <a:pPr/>
-              <a:t>35</a:t>
-            </a:fld>
-            <a:endParaRPr lang="en-US"/>
-          </a:p>
-        </p:txBody>
-      </p:sp>
-      <p:sp>
-        <p:nvSpPr>
-          <p:cNvPr id="3" name="Content Placeholder 2"/>
-          <p:cNvSpPr>
-            <a:spLocks noGrp="1"/>
-          </p:cNvSpPr>
-          <p:nvPr>
-            <p:ph sz="quarter" idx="1"/>
-          </p:nvPr>
-        </p:nvSpPr>
-        <p:spPr/>
-        <p:txBody>
-          <a:bodyPr>
-            <a:normAutofit/>
-          </a:bodyPr>
-          <a:lstStyle/>
-          <a:p>
-            <a:r>
-              <a:rPr lang="en-US"/>
-              <a:t>Given a bipartite graph G, can we find a matching M in G such that M </a:t>
-            </a:r>
-            <a:r>
-              <a:rPr lang="en-US">
-                <a:sym typeface="Symbol"/>
-              </a:rPr>
-              <a:t></a:t>
-            </a:r>
-            <a:r>
-              <a:rPr lang="en-US"/>
-              <a:t> E and each node appears on exactly one of M</a:t>
-            </a:r>
-          </a:p>
-          <a:p>
-            <a:pPr lvl="1" algn="l"/>
-            <a:r>
-              <a:rPr lang="en-US"/>
-              <a:t>In other words, find a subset </a:t>
-            </a:r>
-            <a:br>
-              <a:rPr lang="en-US"/>
-            </a:br>
-            <a:r>
-              <a:rPr lang="en-US"/>
-              <a:t>of edges that connect every </a:t>
-            </a:r>
-            <a:br>
-              <a:rPr lang="en-US"/>
-            </a:br>
-            <a:r>
-              <a:rPr lang="en-US"/>
-              <a:t>node on the left to one (and </a:t>
-            </a:r>
-            <a:br>
-              <a:rPr lang="en-US"/>
-            </a:br>
-            <a:r>
-              <a:rPr lang="en-US"/>
-              <a:t>only one!) node on the right</a:t>
-            </a:r>
-          </a:p>
-          <a:p>
-            <a:pPr lvl="1" algn="l"/>
-            <a:r>
-              <a:rPr lang="en-US"/>
-              <a:t>Since the graph is bipartite, </a:t>
-            </a:r>
-            <a:br>
-              <a:rPr lang="en-US"/>
-            </a:br>
-            <a:r>
-              <a:rPr lang="en-US"/>
-              <a:t>all edges connect one on the </a:t>
-            </a:r>
-            <a:br>
-              <a:rPr lang="en-US"/>
-            </a:br>
-            <a:r>
-              <a:rPr lang="en-US"/>
-              <a:t>left with one on the right</a:t>
-            </a:r>
-          </a:p>
-          <a:p>
-            <a:pPr lvl="1"/>
-            <a:endParaRPr lang="en-US" dirty="0"/>
-          </a:p>
-        </p:txBody>
-      </p:sp>
-      <p:pic>
-        <p:nvPicPr>
-          <p:cNvPr id="5" name="Picture 2" descr="C:\WINDOWS\Desktop\Oh_type\kleinberg_GIF_01to10\kleinberg_07F09.gif"/>
-          <p:cNvPicPr preferRelativeResize="0">
-            <a:picLocks noChangeAspect="1" noChangeArrowheads="1"/>
-          </p:cNvPicPr>
-          <p:nvPr>
-            <p:custDataLst>
-              <p:tags r:id="rId1"/>
-            </p:custDataLst>
-          </p:nvPr>
-        </p:nvPicPr>
-        <p:blipFill>
-          <a:blip r:embed="rId3">
-            <a:clrChange>
-              <a:clrFrom>
-                <a:srgbClr val="FFFFFF"/>
-              </a:clrFrom>
-              <a:clrTo>
-                <a:srgbClr val="FFFFFF">
-                  <a:alpha val="0"/>
-                </a:srgbClr>
-              </a:clrTo>
-            </a:clrChange>
-          </a:blip>
-          <a:srcRect l="7189" t="2029" r="67321" b="28994"/>
-          <a:stretch>
-            <a:fillRect/>
-          </a:stretch>
-        </p:blipFill>
-        <p:spPr bwMode="auto">
-          <a:xfrm>
-            <a:off x="6019800" y="2836985"/>
-            <a:ext cx="2667000" cy="3487615"/>
-          </a:xfrm>
-          <a:prstGeom prst="rect">
-            <a:avLst/>
-          </a:prstGeom>
-          <a:noFill/>
-          <a:ln w="9525">
-            <a:noFill/>
-            <a:miter lim="800000"/>
-            <a:headEnd/>
-            <a:tailEnd/>
-          </a:ln>
-          <a:effectLst/>
-        </p:spPr>
-      </p:pic>
-    </p:spTree>
-  </p:cSld>
-  <p:clrMapOvr>
-    <a:masterClrMapping/>
-  </p:clrMapOvr>
-</p:sld>
-</file>
-
-<file path=ppt/slides/slide36.xml><?xml version="1.0" encoding="utf-8"?>
-<p:sld xmlns:a="http://schemas.openxmlformats.org/drawingml/2006/main" xmlns:r="http://schemas.openxmlformats.org/officeDocument/2006/relationships" xmlns:p="http://schemas.openxmlformats.org/presentationml/2006/main">
-  <p:cSld>
-    <p:spTree>
-      <p:nvGrpSpPr>
-        <p:cNvPr id="1" name=""/>
-        <p:cNvGrpSpPr/>
-        <p:nvPr/>
-      </p:nvGrpSpPr>
-      <p:grpSpPr>
-        <a:xfrm>
-          <a:off x="0" y="0"/>
-          <a:ext cx="0" cy="0"/>
-          <a:chOff x="0" y="0"/>
-          <a:chExt cx="0" cy="0"/>
-        </a:xfrm>
-      </p:grpSpPr>
-      <p:sp>
-        <p:nvSpPr>
-          <p:cNvPr id="2" name="Title 1"/>
-          <p:cNvSpPr>
-            <a:spLocks noGrp="1"/>
-          </p:cNvSpPr>
-          <p:nvPr>
-            <p:ph type="title"/>
-          </p:nvPr>
-        </p:nvSpPr>
-        <p:spPr/>
-        <p:txBody>
-          <a:bodyPr/>
-          <a:lstStyle/>
-          <a:p>
-            <a:r>
-              <a:rPr lang="en-US"/>
-              <a:t>Reduction!</a:t>
-            </a:r>
-            <a:endParaRPr lang="en-US" dirty="0"/>
-          </a:p>
-        </p:txBody>
-      </p:sp>
-      <p:sp>
-        <p:nvSpPr>
-          <p:cNvPr id="4" name="Slide Number Placeholder 3"/>
-          <p:cNvSpPr>
-            <a:spLocks noGrp="1"/>
-          </p:cNvSpPr>
-          <p:nvPr>
-            <p:ph type="sldNum" sz="quarter" idx="12"/>
-          </p:nvPr>
-        </p:nvSpPr>
-        <p:spPr/>
-        <p:txBody>
-          <a:bodyPr/>
-          <a:lstStyle/>
-          <a:p>
-            <a:fld id="{030EE116-056E-4288-B7F7-411CB7E437A9}" type="slidenum">
-              <a:rPr lang="en-US" smtClean="0"/>
-              <a:pPr/>
-              <a:t>36</a:t>
-            </a:fld>
-            <a:endParaRPr lang="en-US"/>
-          </a:p>
-        </p:txBody>
-      </p:sp>
-      <p:sp>
-        <p:nvSpPr>
-          <p:cNvPr id="3" name="Content Placeholder 2"/>
-          <p:cNvSpPr>
-            <a:spLocks noGrp="1"/>
-          </p:cNvSpPr>
-          <p:nvPr>
-            <p:ph sz="quarter" idx="1"/>
-          </p:nvPr>
-        </p:nvSpPr>
-        <p:spPr/>
-        <p:txBody>
-          <a:bodyPr/>
-          <a:lstStyle/>
-          <a:p>
-            <a:r>
-              <a:rPr lang="en-US" dirty="0"/>
-              <a:t>To solve this, we reduce it to a maximal flow problem by creating a graph G’:</a:t>
-            </a:r>
-          </a:p>
-          <a:p>
-            <a:pPr lvl="1"/>
-            <a:r>
-              <a:rPr lang="en-US" dirty="0"/>
-              <a:t>Direct all edges from the left to the right</a:t>
-            </a:r>
-          </a:p>
-          <a:p>
-            <a:pPr lvl="1"/>
-            <a:r>
-              <a:rPr lang="en-US" dirty="0"/>
-              <a:t>Add a source node, with edges to every node on the left side</a:t>
-            </a:r>
-          </a:p>
-          <a:p>
-            <a:pPr lvl="1"/>
-            <a:r>
-              <a:rPr lang="en-US" dirty="0"/>
-              <a:t>Add a terminus node, with edges to every node on the right side</a:t>
-            </a:r>
-          </a:p>
-          <a:p>
-            <a:r>
-              <a:rPr lang="en-US" dirty="0"/>
-              <a:t>Compute maximal flow!</a:t>
-            </a:r>
-          </a:p>
-          <a:p>
-            <a:pPr lvl="1"/>
-            <a:r>
-              <a:rPr lang="en-US" dirty="0"/>
-              <a:t>The maximal flow in G’ is the maximum matching in G</a:t>
-            </a:r>
-          </a:p>
-        </p:txBody>
-      </p:sp>
-    </p:spTree>
-  </p:cSld>
-  <p:clrMapOvr>
-    <a:masterClrMapping/>
-  </p:clrMapOvr>
-</p:sld>
-</file>
-
-<file path=ppt/slides/slide37.xml><?xml version="1.0" encoding="utf-8"?>
-<p:sld xmlns:a="http://schemas.openxmlformats.org/drawingml/2006/main" xmlns:r="http://schemas.openxmlformats.org/officeDocument/2006/relationships" xmlns:p="http://schemas.openxmlformats.org/presentationml/2006/main">
-  <p:cSld>
-    <p:spTree>
-      <p:nvGrpSpPr>
-        <p:cNvPr id="1" name=""/>
-        <p:cNvGrpSpPr/>
-        <p:nvPr/>
-      </p:nvGrpSpPr>
-      <p:grpSpPr>
-        <a:xfrm>
-          <a:off x="0" y="0"/>
-          <a:ext cx="0" cy="0"/>
-          <a:chOff x="0" y="0"/>
-          <a:chExt cx="0" cy="0"/>
-        </a:xfrm>
-      </p:grpSpPr>
-      <p:sp>
-        <p:nvSpPr>
-          <p:cNvPr id="2" name="Title 1"/>
-          <p:cNvSpPr>
-            <a:spLocks noGrp="1"/>
-          </p:cNvSpPr>
-          <p:nvPr>
-            <p:ph type="title"/>
-          </p:nvPr>
-        </p:nvSpPr>
-        <p:spPr/>
-        <p:txBody>
-          <a:bodyPr/>
-          <a:lstStyle/>
-          <a:p>
-            <a:r>
-              <a:rPr lang="en-US"/>
-              <a:t>Reduction, diagrammatically</a:t>
-            </a:r>
-            <a:endParaRPr lang="en-US" dirty="0"/>
-          </a:p>
-        </p:txBody>
-      </p:sp>
-      <p:sp>
-        <p:nvSpPr>
-          <p:cNvPr id="4" name="Slide Number Placeholder 3"/>
-          <p:cNvSpPr>
-            <a:spLocks noGrp="1"/>
-          </p:cNvSpPr>
-          <p:nvPr>
-            <p:ph type="sldNum" sz="quarter" idx="12"/>
-          </p:nvPr>
-        </p:nvSpPr>
-        <p:spPr/>
-        <p:txBody>
-          <a:bodyPr/>
-          <a:lstStyle/>
-          <a:p>
-            <a:fld id="{030EE116-056E-4288-B7F7-411CB7E437A9}" type="slidenum">
-              <a:rPr lang="en-US" smtClean="0"/>
-              <a:pPr/>
-              <a:t>37</a:t>
-            </a:fld>
-            <a:endParaRPr lang="en-US"/>
-          </a:p>
-        </p:txBody>
-      </p:sp>
-      <p:pic>
-        <p:nvPicPr>
-          <p:cNvPr id="9" name="Picture 2" descr="C:\WINDOWS\Desktop\Oh_type\kleinberg_GIF_01to10\kleinberg_07F09.gif"/>
-          <p:cNvPicPr preferRelativeResize="0">
-            <a:picLocks noGrp="1" noChangeAspect="1" noChangeArrowheads="1"/>
-          </p:cNvPicPr>
-          <p:nvPr>
-            <p:ph sz="quarter" idx="1"/>
-            <p:custDataLst>
-              <p:tags r:id="rId1"/>
-            </p:custDataLst>
-          </p:nvPr>
-        </p:nvPicPr>
-        <p:blipFill>
-          <a:blip r:embed="rId3"/>
-          <a:srcRect b="26965"/>
-          <a:stretch>
-            <a:fillRect/>
-          </a:stretch>
-        </p:blipFill>
-        <p:spPr>
-          <a:xfrm>
-            <a:off x="457200" y="2235148"/>
-            <a:ext cx="8229600" cy="2905228"/>
-          </a:xfrm>
-        </p:spPr>
-      </p:pic>
-    </p:spTree>
-  </p:cSld>
-  <p:clrMapOvr>
-    <a:masterClrMapping/>
-  </p:clrMapOvr>
-</p:sld>
-</file>
-
-<file path=ppt/slides/slide38.xml><?xml version="1.0" encoding="utf-8"?>
-<p:sld xmlns:a="http://schemas.openxmlformats.org/drawingml/2006/main" xmlns:r="http://schemas.openxmlformats.org/officeDocument/2006/relationships" xmlns:p="http://schemas.openxmlformats.org/presentationml/2006/main">
-  <p:cSld>
-    <p:spTree>
-      <p:nvGrpSpPr>
-        <p:cNvPr id="1" name=""/>
-        <p:cNvGrpSpPr/>
-        <p:nvPr/>
-      </p:nvGrpSpPr>
-      <p:grpSpPr>
-        <a:xfrm>
-          <a:off x="0" y="0"/>
-          <a:ext cx="0" cy="0"/>
-          <a:chOff x="0" y="0"/>
-          <a:chExt cx="0" cy="0"/>
-        </a:xfrm>
-      </p:grpSpPr>
-      <p:sp>
-        <p:nvSpPr>
-          <p:cNvPr id="2" name="Title 1"/>
-          <p:cNvSpPr>
-            <a:spLocks noGrp="1"/>
-          </p:cNvSpPr>
-          <p:nvPr>
-            <p:ph type="title"/>
-          </p:nvPr>
-        </p:nvSpPr>
-        <p:spPr/>
-        <p:txBody>
-          <a:bodyPr/>
-          <a:lstStyle/>
-          <a:p>
-            <a:r>
-              <a:rPr lang="en-US"/>
-              <a:t>Why does this work?</a:t>
-            </a:r>
-            <a:endParaRPr lang="en-US" dirty="0"/>
-          </a:p>
-        </p:txBody>
-      </p:sp>
-      <p:sp>
-        <p:nvSpPr>
-          <p:cNvPr id="4" name="Slide Number Placeholder 3"/>
-          <p:cNvSpPr>
-            <a:spLocks noGrp="1"/>
-          </p:cNvSpPr>
-          <p:nvPr>
-            <p:ph type="sldNum" sz="quarter" idx="12"/>
-          </p:nvPr>
-        </p:nvSpPr>
-        <p:spPr/>
-        <p:txBody>
-          <a:bodyPr/>
-          <a:lstStyle/>
-          <a:p>
-            <a:fld id="{030EE116-056E-4288-B7F7-411CB7E437A9}" type="slidenum">
-              <a:rPr lang="en-US" smtClean="0"/>
-              <a:pPr/>
-              <a:t>38</a:t>
-            </a:fld>
-            <a:endParaRPr lang="en-US"/>
-          </a:p>
-        </p:txBody>
-      </p:sp>
-      <p:sp>
-        <p:nvSpPr>
-          <p:cNvPr id="3" name="Content Placeholder 2"/>
-          <p:cNvSpPr>
-            <a:spLocks noGrp="1"/>
-          </p:cNvSpPr>
-          <p:nvPr>
-            <p:ph sz="quarter" idx="1"/>
-          </p:nvPr>
-        </p:nvSpPr>
-        <p:spPr/>
-        <p:txBody>
-          <a:bodyPr/>
-          <a:lstStyle/>
-          <a:p>
-            <a:r>
-              <a:rPr lang="en-US"/>
-              <a:t>Each node on the left can be in at most one matching</a:t>
-            </a:r>
-          </a:p>
-          <a:p>
-            <a:pPr lvl="1"/>
-            <a:r>
-              <a:rPr lang="en-US"/>
-              <a:t>This is enforced by the edge of capacity one leading into it</a:t>
-            </a:r>
-          </a:p>
-          <a:p>
-            <a:r>
-              <a:rPr lang="en-US"/>
-              <a:t>Likewise for each node on the right</a:t>
-            </a:r>
-          </a:p>
-          <a:p>
-            <a:r>
-              <a:rPr lang="en-US"/>
-              <a:t>The bottleneck will be how it flows across the bipartite “barrier”</a:t>
-            </a:r>
-            <a:endParaRPr lang="en-US" dirty="0"/>
-          </a:p>
-        </p:txBody>
-      </p:sp>
-    </p:spTree>
-  </p:cSld>
-  <p:clrMapOvr>
-    <a:masterClrMapping/>
-  </p:clrMapOvr>
-</p:sld>
-</file>
-
-<file path=ppt/slides/slide39.xml><?xml version="1.0" encoding="utf-8"?>
-<p:sld xmlns:a="http://schemas.openxmlformats.org/drawingml/2006/main" xmlns:r="http://schemas.openxmlformats.org/officeDocument/2006/relationships" xmlns:p="http://schemas.openxmlformats.org/presentationml/2006/main">
-  <p:cSld>
-    <p:spTree>
-      <p:nvGrpSpPr>
-        <p:cNvPr id="1" name=""/>
-        <p:cNvGrpSpPr/>
-        <p:nvPr/>
-      </p:nvGrpSpPr>
-      <p:grpSpPr>
-        <a:xfrm>
-          <a:off x="0" y="0"/>
-          <a:ext cx="0" cy="0"/>
-          <a:chOff x="0" y="0"/>
-          <a:chExt cx="0" cy="0"/>
-        </a:xfrm>
-      </p:grpSpPr>
-      <p:sp>
-        <p:nvSpPr>
-          <p:cNvPr id="2" name="Title 1"/>
-          <p:cNvSpPr>
-            <a:spLocks noGrp="1"/>
-          </p:cNvSpPr>
-          <p:nvPr>
-            <p:ph type="title"/>
-          </p:nvPr>
-        </p:nvSpPr>
-        <p:spPr/>
-        <p:txBody>
-          <a:bodyPr/>
-          <a:lstStyle/>
-          <a:p>
-            <a:r>
-              <a:rPr lang="en-US"/>
-              <a:t>Reduction details</a:t>
-            </a:r>
-            <a:endParaRPr lang="en-US" dirty="0"/>
-          </a:p>
-        </p:txBody>
-      </p:sp>
-      <p:sp>
-        <p:nvSpPr>
-          <p:cNvPr id="4" name="Slide Number Placeholder 3"/>
-          <p:cNvSpPr>
-            <a:spLocks noGrp="1"/>
-          </p:cNvSpPr>
-          <p:nvPr>
-            <p:ph type="sldNum" sz="quarter" idx="12"/>
-          </p:nvPr>
-        </p:nvSpPr>
-        <p:spPr/>
-        <p:txBody>
-          <a:bodyPr/>
-          <a:lstStyle/>
-          <a:p>
-            <a:fld id="{030EE116-056E-4288-B7F7-411CB7E437A9}" type="slidenum">
-              <a:rPr lang="en-US" smtClean="0"/>
-              <a:pPr/>
-              <a:t>39</a:t>
-            </a:fld>
-            <a:endParaRPr lang="en-US"/>
-          </a:p>
-        </p:txBody>
-      </p:sp>
-      <p:sp>
-        <p:nvSpPr>
-          <p:cNvPr id="3" name="Content Placeholder 2"/>
-          <p:cNvSpPr>
-            <a:spLocks noGrp="1"/>
-          </p:cNvSpPr>
-          <p:nvPr>
-            <p:ph sz="quarter" idx="1"/>
-          </p:nvPr>
-        </p:nvSpPr>
-        <p:spPr/>
-        <p:txBody>
-          <a:bodyPr/>
-          <a:lstStyle/>
-          <a:p>
-            <a:r>
-              <a:rPr lang="en-US" dirty="0"/>
-              <a:t>We have transformed (in polynomial time) a bipartite matching problem into a maximal flow problem</a:t>
-            </a:r>
-          </a:p>
-          <a:p>
-            <a:r>
-              <a:rPr lang="en-US" dirty="0"/>
-              <a:t>Specifically, bipartite-matching ≤</a:t>
-            </a:r>
-            <a:r>
-              <a:rPr lang="en-US" baseline="-25000" dirty="0"/>
-              <a:t>p</a:t>
-            </a:r>
-            <a:r>
-              <a:rPr lang="en-US" dirty="0"/>
-              <a:t> max-flow</a:t>
-            </a:r>
-          </a:p>
-          <a:p>
-            <a:pPr lvl="1"/>
-            <a:r>
-              <a:rPr lang="en-US" dirty="0"/>
-              <a:t>Because we can transform bipartite matching to max-flow in polynomial time</a:t>
-            </a:r>
-          </a:p>
-          <a:p>
-            <a:r>
-              <a:rPr lang="en-US" dirty="0"/>
-              <a:t>But is it the case that max-flow ≤</a:t>
-            </a:r>
-            <a:r>
-              <a:rPr lang="en-US" baseline="-25000" dirty="0"/>
-              <a:t>p</a:t>
-            </a:r>
-            <a:r>
-              <a:rPr lang="en-US" dirty="0"/>
-              <a:t> bipartite-matching?</a:t>
-            </a:r>
-          </a:p>
-          <a:p>
-            <a:pPr lvl="1"/>
-            <a:r>
-              <a:rPr lang="en-US" dirty="0"/>
-              <a:t>Not so much: a solution to bipartite matching does not help us with a non-bipartite graph</a:t>
+              <a:t>An introduction to reductions (topic of next section)</a:t>
             </a:r>
           </a:p>
         </p:txBody>
@@ -9590,1317 +7604,6 @@
 </p:sld>
 </file>
 
-<file path=ppt/slides/slide40.xml><?xml version="1.0" encoding="utf-8"?>
-<p:sld xmlns:a="http://schemas.openxmlformats.org/drawingml/2006/main" xmlns:r="http://schemas.openxmlformats.org/officeDocument/2006/relationships" xmlns:p="http://schemas.openxmlformats.org/presentationml/2006/main">
-  <p:cSld>
-    <p:spTree>
-      <p:nvGrpSpPr>
-        <p:cNvPr id="1" name=""/>
-        <p:cNvGrpSpPr/>
-        <p:nvPr/>
-      </p:nvGrpSpPr>
-      <p:grpSpPr>
-        <a:xfrm>
-          <a:off x="0" y="0"/>
-          <a:ext cx="0" cy="0"/>
-          <a:chOff x="0" y="0"/>
-          <a:chExt cx="0" cy="0"/>
-        </a:xfrm>
-      </p:grpSpPr>
-      <p:sp>
-        <p:nvSpPr>
-          <p:cNvPr id="2" name="Title 1"/>
-          <p:cNvSpPr>
-            <a:spLocks noGrp="1"/>
-          </p:cNvSpPr>
-          <p:nvPr>
-            <p:ph type="title"/>
-          </p:nvPr>
-        </p:nvSpPr>
-        <p:spPr/>
-        <p:txBody>
-          <a:bodyPr/>
-          <a:lstStyle/>
-          <a:p>
-            <a:r>
-              <a:rPr lang="en-US"/>
-              <a:t>Running time</a:t>
-            </a:r>
-            <a:endParaRPr lang="en-US" dirty="0"/>
-          </a:p>
-        </p:txBody>
-      </p:sp>
-      <p:sp>
-        <p:nvSpPr>
-          <p:cNvPr id="4" name="Slide Number Placeholder 3"/>
-          <p:cNvSpPr>
-            <a:spLocks noGrp="1"/>
-          </p:cNvSpPr>
-          <p:nvPr>
-            <p:ph type="sldNum" sz="quarter" idx="12"/>
-          </p:nvPr>
-        </p:nvSpPr>
-        <p:spPr/>
-        <p:txBody>
-          <a:bodyPr/>
-          <a:lstStyle/>
-          <a:p>
-            <a:fld id="{030EE116-056E-4288-B7F7-411CB7E437A9}" type="slidenum">
-              <a:rPr lang="en-US" smtClean="0"/>
-              <a:pPr/>
-              <a:t>40</a:t>
-            </a:fld>
-            <a:endParaRPr lang="en-US"/>
-          </a:p>
-        </p:txBody>
-      </p:sp>
-      <p:sp>
-        <p:nvSpPr>
-          <p:cNvPr id="3" name="Content Placeholder 2"/>
-          <p:cNvSpPr>
-            <a:spLocks noGrp="1"/>
-          </p:cNvSpPr>
-          <p:nvPr>
-            <p:ph sz="quarter" idx="1"/>
-          </p:nvPr>
-        </p:nvSpPr>
-        <p:spPr/>
-        <p:txBody>
-          <a:bodyPr/>
-          <a:lstStyle/>
-          <a:p>
-            <a:r>
-              <a:rPr lang="en-US" dirty="0"/>
-              <a:t>Max flow runs in O(E*f)</a:t>
-            </a:r>
-          </a:p>
-          <a:p>
-            <a:pPr lvl="1"/>
-            <a:r>
-              <a:rPr lang="en-US" dirty="0"/>
-              <a:t>But the max flow is (at most) n/2</a:t>
-            </a:r>
-          </a:p>
-          <a:p>
-            <a:pPr lvl="2"/>
-            <a:r>
-              <a:rPr lang="en-US" dirty="0"/>
-              <a:t>If every node in the graph has flow through it, then there are n/2 units of flow moving through the graph</a:t>
-            </a:r>
-          </a:p>
-          <a:p>
-            <a:pPr lvl="1"/>
-            <a:r>
-              <a:rPr lang="en-US" dirty="0"/>
-              <a:t>So the running time is equivalent to O(E*n)</a:t>
-            </a:r>
-          </a:p>
-        </p:txBody>
-      </p:sp>
-    </p:spTree>
-  </p:cSld>
-  <p:clrMapOvr>
-    <a:masterClrMapping/>
-  </p:clrMapOvr>
-</p:sld>
-</file>
-
-<file path=ppt/slides/slide41.xml><?xml version="1.0" encoding="utf-8"?>
-<p:sld xmlns:a="http://schemas.openxmlformats.org/drawingml/2006/main" xmlns:r="http://schemas.openxmlformats.org/officeDocument/2006/relationships" xmlns:p="http://schemas.openxmlformats.org/presentationml/2006/main">
-  <p:cSld>
-    <p:spTree>
-      <p:nvGrpSpPr>
-        <p:cNvPr id="1" name=""/>
-        <p:cNvGrpSpPr/>
-        <p:nvPr/>
-      </p:nvGrpSpPr>
-      <p:grpSpPr>
-        <a:xfrm>
-          <a:off x="0" y="0"/>
-          <a:ext cx="0" cy="0"/>
-          <a:chOff x="0" y="0"/>
-          <a:chExt cx="0" cy="0"/>
-        </a:xfrm>
-      </p:grpSpPr>
-      <p:sp>
-        <p:nvSpPr>
-          <p:cNvPr id="2" name="Title 1"/>
-          <p:cNvSpPr>
-            <a:spLocks noGrp="1"/>
-          </p:cNvSpPr>
-          <p:nvPr>
-            <p:ph type="title"/>
-          </p:nvPr>
-        </p:nvSpPr>
-        <p:spPr/>
-        <p:txBody>
-          <a:bodyPr/>
-          <a:lstStyle/>
-          <a:p>
-            <a:r>
-              <a:rPr lang="en-US"/>
-              <a:t>Imperfect bipartite matchings</a:t>
-            </a:r>
-            <a:endParaRPr lang="en-US" dirty="0"/>
-          </a:p>
-        </p:txBody>
-      </p:sp>
-      <p:sp>
-        <p:nvSpPr>
-          <p:cNvPr id="4" name="Slide Number Placeholder 3"/>
-          <p:cNvSpPr>
-            <a:spLocks noGrp="1"/>
-          </p:cNvSpPr>
-          <p:nvPr>
-            <p:ph type="sldNum" sz="quarter" idx="12"/>
-          </p:nvPr>
-        </p:nvSpPr>
-        <p:spPr/>
-        <p:txBody>
-          <a:bodyPr/>
-          <a:lstStyle/>
-          <a:p>
-            <a:fld id="{030EE116-056E-4288-B7F7-411CB7E437A9}" type="slidenum">
-              <a:rPr lang="en-US" smtClean="0"/>
-              <a:pPr/>
-              <a:t>41</a:t>
-            </a:fld>
-            <a:endParaRPr lang="en-US"/>
-          </a:p>
-        </p:txBody>
-      </p:sp>
-      <p:sp>
-        <p:nvSpPr>
-          <p:cNvPr id="3" name="Content Placeholder 2"/>
-          <p:cNvSpPr>
-            <a:spLocks noGrp="1"/>
-          </p:cNvSpPr>
-          <p:nvPr>
-            <p:ph sz="quarter" idx="1"/>
-          </p:nvPr>
-        </p:nvSpPr>
-        <p:spPr/>
-        <p:txBody>
-          <a:bodyPr/>
-          <a:lstStyle/>
-          <a:p>
-            <a:r>
-              <a:rPr lang="en-US"/>
-              <a:t>These exist, and the algorithm may produce them, depending on the graph</a:t>
-            </a:r>
-          </a:p>
-          <a:p>
-            <a:pPr lvl="1"/>
-            <a:r>
-              <a:rPr lang="en-US"/>
-              <a:t>The following shows an augmenting path (in the middle) used to achieve the maximal flow on the right</a:t>
-            </a:r>
-            <a:endParaRPr lang="en-US" dirty="0"/>
-          </a:p>
-        </p:txBody>
-      </p:sp>
-      <p:pic>
-        <p:nvPicPr>
-          <p:cNvPr id="5" name="Picture 2" descr="C:\WINDOWS\Desktop\Oh_type\kleinberg_GIF_01to10\kleinberg_07F10.gif"/>
-          <p:cNvPicPr preferRelativeResize="0">
-            <a:picLocks noChangeAspect="1" noChangeArrowheads="1"/>
-          </p:cNvPicPr>
-          <p:nvPr>
-            <p:custDataLst>
-              <p:tags r:id="rId1"/>
-            </p:custDataLst>
-          </p:nvPr>
-        </p:nvPicPr>
-        <p:blipFill>
-          <a:blip r:embed="rId3"/>
-          <a:srcRect b="28753"/>
-          <a:stretch>
-            <a:fillRect/>
-          </a:stretch>
-        </p:blipFill>
-        <p:spPr bwMode="auto">
-          <a:xfrm>
-            <a:off x="609600" y="3657600"/>
-            <a:ext cx="7772400" cy="2667000"/>
-          </a:xfrm>
-          <a:prstGeom prst="rect">
-            <a:avLst/>
-          </a:prstGeom>
-          <a:noFill/>
-          <a:ln w="9525">
-            <a:noFill/>
-            <a:miter lim="800000"/>
-            <a:headEnd/>
-            <a:tailEnd/>
-          </a:ln>
-          <a:effectLst/>
-        </p:spPr>
-      </p:pic>
-    </p:spTree>
-  </p:cSld>
-  <p:clrMapOvr>
-    <a:masterClrMapping/>
-  </p:clrMapOvr>
-</p:sld>
-</file>
-
-<file path=ppt/slides/slide42.xml><?xml version="1.0" encoding="utf-8"?>
-<p:sld xmlns:a="http://schemas.openxmlformats.org/drawingml/2006/main" xmlns:r="http://schemas.openxmlformats.org/officeDocument/2006/relationships" xmlns:p="http://schemas.openxmlformats.org/presentationml/2006/main">
-  <p:cSld>
-    <p:spTree>
-      <p:nvGrpSpPr>
-        <p:cNvPr id="1" name=""/>
-        <p:cNvGrpSpPr/>
-        <p:nvPr/>
-      </p:nvGrpSpPr>
-      <p:grpSpPr>
-        <a:xfrm>
-          <a:off x="0" y="0"/>
-          <a:ext cx="0" cy="0"/>
-          <a:chOff x="0" y="0"/>
-          <a:chExt cx="0" cy="0"/>
-        </a:xfrm>
-      </p:grpSpPr>
-      <p:sp>
-        <p:nvSpPr>
-          <p:cNvPr id="11" name="Title 10"/>
-          <p:cNvSpPr>
-            <a:spLocks noGrp="1"/>
-          </p:cNvSpPr>
-          <p:nvPr>
-            <p:ph type="title"/>
-          </p:nvPr>
-        </p:nvSpPr>
-        <p:spPr/>
-        <p:txBody>
-          <a:bodyPr/>
-          <a:lstStyle/>
-          <a:p>
-            <a:r>
-              <a:rPr lang="en-US" dirty="0"/>
-              <a:t>Max-flow variations</a:t>
-            </a:r>
-          </a:p>
-        </p:txBody>
-      </p:sp>
-      <p:sp>
-        <p:nvSpPr>
-          <p:cNvPr id="12" name="Text Placeholder 11"/>
-          <p:cNvSpPr>
-            <a:spLocks noGrp="1"/>
-          </p:cNvSpPr>
-          <p:nvPr>
-            <p:ph type="body" idx="1"/>
-          </p:nvPr>
-        </p:nvSpPr>
-        <p:spPr/>
-        <p:txBody>
-          <a:bodyPr/>
-          <a:lstStyle/>
-          <a:p>
-            <a:endParaRPr lang="en-US"/>
-          </a:p>
-        </p:txBody>
-      </p:sp>
-      <p:sp>
-        <p:nvSpPr>
-          <p:cNvPr id="4" name="Slide Number Placeholder 3"/>
-          <p:cNvSpPr>
-            <a:spLocks noGrp="1"/>
-          </p:cNvSpPr>
-          <p:nvPr>
-            <p:ph type="sldNum" sz="quarter" idx="12"/>
-          </p:nvPr>
-        </p:nvSpPr>
-        <p:spPr/>
-        <p:txBody>
-          <a:bodyPr/>
-          <a:lstStyle/>
-          <a:p>
-            <a:fld id="{030EE116-056E-4288-B7F7-411CB7E437A9}" type="slidenum">
-              <a:rPr lang="en-US" smtClean="0"/>
-              <a:pPr/>
-              <a:t>42</a:t>
-            </a:fld>
-            <a:endParaRPr lang="en-US"/>
-          </a:p>
-        </p:txBody>
-      </p:sp>
-    </p:spTree>
-  </p:cSld>
-  <p:clrMapOvr>
-    <a:masterClrMapping/>
-  </p:clrMapOvr>
-</p:sld>
-</file>
-
-<file path=ppt/slides/slide43.xml><?xml version="1.0" encoding="utf-8"?>
-<p:sld xmlns:a="http://schemas.openxmlformats.org/drawingml/2006/main" xmlns:r="http://schemas.openxmlformats.org/officeDocument/2006/relationships" xmlns:p="http://schemas.openxmlformats.org/presentationml/2006/main">
-  <p:cSld>
-    <p:spTree>
-      <p:nvGrpSpPr>
-        <p:cNvPr id="1" name=""/>
-        <p:cNvGrpSpPr/>
-        <p:nvPr/>
-      </p:nvGrpSpPr>
-      <p:grpSpPr>
-        <a:xfrm>
-          <a:off x="0" y="0"/>
-          <a:ext cx="0" cy="0"/>
-          <a:chOff x="0" y="0"/>
-          <a:chExt cx="0" cy="0"/>
-        </a:xfrm>
-      </p:grpSpPr>
-      <p:sp>
-        <p:nvSpPr>
-          <p:cNvPr id="7" name="Title 6"/>
-          <p:cNvSpPr>
-            <a:spLocks noGrp="1"/>
-          </p:cNvSpPr>
-          <p:nvPr>
-            <p:ph type="title"/>
-          </p:nvPr>
-        </p:nvSpPr>
-        <p:spPr/>
-        <p:txBody>
-          <a:bodyPr/>
-          <a:lstStyle/>
-          <a:p>
-            <a:r>
-              <a:rPr lang="en-US"/>
-              <a:t>Finding a Circulation</a:t>
-            </a:r>
-            <a:endParaRPr lang="en-US" dirty="0"/>
-          </a:p>
-        </p:txBody>
-      </p:sp>
-      <p:sp>
-        <p:nvSpPr>
-          <p:cNvPr id="4" name="Slide Number Placeholder 3"/>
-          <p:cNvSpPr>
-            <a:spLocks noGrp="1"/>
-          </p:cNvSpPr>
-          <p:nvPr>
-            <p:ph type="sldNum" sz="quarter" idx="12"/>
-          </p:nvPr>
-        </p:nvSpPr>
-        <p:spPr/>
-        <p:txBody>
-          <a:bodyPr/>
-          <a:lstStyle/>
-          <a:p>
-            <a:fld id="{030EE116-056E-4288-B7F7-411CB7E437A9}" type="slidenum">
-              <a:rPr lang="en-US" smtClean="0"/>
-              <a:pPr/>
-              <a:t>43</a:t>
-            </a:fld>
-            <a:endParaRPr lang="en-US"/>
-          </a:p>
-        </p:txBody>
-      </p:sp>
-      <p:sp>
-        <p:nvSpPr>
-          <p:cNvPr id="8" name="Content Placeholder 7"/>
-          <p:cNvSpPr>
-            <a:spLocks noGrp="1"/>
-          </p:cNvSpPr>
-          <p:nvPr>
-            <p:ph sz="quarter" idx="1"/>
-          </p:nvPr>
-        </p:nvSpPr>
-        <p:spPr/>
-        <p:txBody>
-          <a:bodyPr/>
-          <a:lstStyle/>
-          <a:p>
-            <a:r>
-              <a:rPr lang="en-US"/>
-              <a:t>Real world applications don’t have just one source and sink</a:t>
-            </a:r>
-          </a:p>
-          <a:p>
-            <a:pPr lvl="1"/>
-            <a:r>
-              <a:rPr lang="en-US"/>
-              <a:t>Instead there are multiple ones: power production / consumption, etc.</a:t>
-            </a:r>
-          </a:p>
-          <a:p>
-            <a:r>
-              <a:rPr lang="en-US"/>
-              <a:t>We designate a set S to be all the nodes that are sources</a:t>
-            </a:r>
-          </a:p>
-          <a:p>
-            <a:pPr lvl="1"/>
-            <a:r>
-              <a:rPr lang="en-US"/>
-              <a:t>We can also view them has having negative demand</a:t>
-            </a:r>
-          </a:p>
-          <a:p>
-            <a:r>
-              <a:rPr lang="en-US"/>
-              <a:t>Likewise, we designate a set T to be all the nodes that are sinks</a:t>
-            </a:r>
-          </a:p>
-          <a:p>
-            <a:pPr lvl="1"/>
-            <a:r>
-              <a:rPr lang="en-US"/>
-              <a:t>They have positive demand</a:t>
-            </a:r>
-          </a:p>
-          <a:p>
-            <a:r>
-              <a:rPr lang="en-US"/>
-              <a:t>Networks with multiple sources and sinks (modeled using demand) are called </a:t>
-            </a:r>
-            <a:r>
-              <a:rPr lang="en-US" i="1"/>
-              <a:t>circulation networks</a:t>
-            </a:r>
-            <a:endParaRPr lang="en-US" dirty="0"/>
-          </a:p>
-        </p:txBody>
-      </p:sp>
-    </p:spTree>
-  </p:cSld>
-  <p:clrMapOvr>
-    <a:masterClrMapping/>
-  </p:clrMapOvr>
-</p:sld>
-</file>
-
-<file path=ppt/slides/slide44.xml><?xml version="1.0" encoding="utf-8"?>
-<p:sld xmlns:a="http://schemas.openxmlformats.org/drawingml/2006/main" xmlns:r="http://schemas.openxmlformats.org/officeDocument/2006/relationships" xmlns:p="http://schemas.openxmlformats.org/presentationml/2006/main">
-  <p:cSld>
-    <p:spTree>
-      <p:nvGrpSpPr>
-        <p:cNvPr id="1" name=""/>
-        <p:cNvGrpSpPr/>
-        <p:nvPr/>
-      </p:nvGrpSpPr>
-      <p:grpSpPr>
-        <a:xfrm>
-          <a:off x="0" y="0"/>
-          <a:ext cx="0" cy="0"/>
-          <a:chOff x="0" y="0"/>
-          <a:chExt cx="0" cy="0"/>
-        </a:xfrm>
-      </p:grpSpPr>
-      <p:sp>
-        <p:nvSpPr>
-          <p:cNvPr id="2" name="Title 1"/>
-          <p:cNvSpPr>
-            <a:spLocks noGrp="1"/>
-          </p:cNvSpPr>
-          <p:nvPr>
-            <p:ph type="title"/>
-          </p:nvPr>
-        </p:nvSpPr>
-        <p:spPr/>
-        <p:txBody>
-          <a:bodyPr/>
-          <a:lstStyle/>
-          <a:p>
-            <a:r>
-              <a:rPr lang="en-US"/>
-              <a:t>Reduction to max-flow</a:t>
-            </a:r>
-            <a:endParaRPr lang="en-US" dirty="0"/>
-          </a:p>
-        </p:txBody>
-      </p:sp>
-      <p:sp>
-        <p:nvSpPr>
-          <p:cNvPr id="4" name="Slide Number Placeholder 3"/>
-          <p:cNvSpPr>
-            <a:spLocks noGrp="1"/>
-          </p:cNvSpPr>
-          <p:nvPr>
-            <p:ph type="sldNum" sz="quarter" idx="12"/>
-          </p:nvPr>
-        </p:nvSpPr>
-        <p:spPr/>
-        <p:txBody>
-          <a:bodyPr/>
-          <a:lstStyle/>
-          <a:p>
-            <a:fld id="{030EE116-056E-4288-B7F7-411CB7E437A9}" type="slidenum">
-              <a:rPr lang="en-US" smtClean="0"/>
-              <a:pPr/>
-              <a:t>44</a:t>
-            </a:fld>
-            <a:endParaRPr lang="en-US"/>
-          </a:p>
-        </p:txBody>
-      </p:sp>
-      <p:sp>
-        <p:nvSpPr>
-          <p:cNvPr id="3" name="Content Placeholder 2"/>
-          <p:cNvSpPr>
-            <a:spLocks noGrp="1"/>
-          </p:cNvSpPr>
-          <p:nvPr>
-            <p:ph sz="quarter" idx="1"/>
-          </p:nvPr>
-        </p:nvSpPr>
-        <p:spPr/>
-        <p:txBody>
-          <a:bodyPr/>
-          <a:lstStyle/>
-          <a:p>
-            <a:r>
-              <a:rPr lang="en-US"/>
-              <a:t>With a few modifications, we can make this a max-flow problem:</a:t>
-            </a:r>
-          </a:p>
-          <a:p>
-            <a:pPr lvl="1"/>
-            <a:r>
-              <a:rPr lang="en-US"/>
-              <a:t>Create a ‘super source’ s* with edges to each node in S</a:t>
-            </a:r>
-          </a:p>
-          <a:p>
-            <a:pPr lvl="2"/>
-            <a:r>
-              <a:rPr lang="en-US"/>
-              <a:t>The capacity of that edge is the size of the source of the node in S</a:t>
-            </a:r>
-          </a:p>
-          <a:p>
-            <a:pPr lvl="1"/>
-            <a:r>
-              <a:rPr lang="en-US"/>
-              <a:t>Likewise with the set T</a:t>
-            </a:r>
-            <a:endParaRPr lang="en-US" dirty="0"/>
-          </a:p>
-        </p:txBody>
-      </p:sp>
-      <p:pic>
-        <p:nvPicPr>
-          <p:cNvPr id="5" name="Picture 2" descr="C:\WINDOWS\Desktop\Oh_type\kleinberg_GIF_01to10\kleinberg_07F14.gif"/>
-          <p:cNvPicPr preferRelativeResize="0">
-            <a:picLocks noChangeAspect="1" noChangeArrowheads="1"/>
-          </p:cNvPicPr>
-          <p:nvPr>
-            <p:custDataLst>
-              <p:tags r:id="rId1"/>
-            </p:custDataLst>
-          </p:nvPr>
-        </p:nvPicPr>
-        <p:blipFill>
-          <a:blip r:embed="rId3"/>
-          <a:srcRect b="12470"/>
-          <a:stretch>
-            <a:fillRect/>
-          </a:stretch>
-        </p:blipFill>
-        <p:spPr bwMode="auto">
-          <a:xfrm>
-            <a:off x="838200" y="3810000"/>
-            <a:ext cx="7315200" cy="2941637"/>
-          </a:xfrm>
-          <a:prstGeom prst="rect">
-            <a:avLst/>
-          </a:prstGeom>
-          <a:noFill/>
-          <a:ln w="9525">
-            <a:noFill/>
-            <a:miter lim="800000"/>
-            <a:headEnd/>
-            <a:tailEnd/>
-          </a:ln>
-          <a:effectLst/>
-        </p:spPr>
-      </p:pic>
-    </p:spTree>
-  </p:cSld>
-  <p:clrMapOvr>
-    <a:masterClrMapping/>
-  </p:clrMapOvr>
-</p:sld>
-</file>
-
-<file path=ppt/slides/slide45.xml><?xml version="1.0" encoding="utf-8"?>
-<p:sld xmlns:a="http://schemas.openxmlformats.org/drawingml/2006/main" xmlns:r="http://schemas.openxmlformats.org/officeDocument/2006/relationships" xmlns:p="http://schemas.openxmlformats.org/presentationml/2006/main">
-  <p:cSld>
-    <p:spTree>
-      <p:nvGrpSpPr>
-        <p:cNvPr id="1" name=""/>
-        <p:cNvGrpSpPr/>
-        <p:nvPr/>
-      </p:nvGrpSpPr>
-      <p:grpSpPr>
-        <a:xfrm>
-          <a:off x="0" y="0"/>
-          <a:ext cx="0" cy="0"/>
-          <a:chOff x="0" y="0"/>
-          <a:chExt cx="0" cy="0"/>
-        </a:xfrm>
-      </p:grpSpPr>
-      <p:sp>
-        <p:nvSpPr>
-          <p:cNvPr id="2" name="Title 1"/>
-          <p:cNvSpPr>
-            <a:spLocks noGrp="1"/>
-          </p:cNvSpPr>
-          <p:nvPr>
-            <p:ph type="title"/>
-          </p:nvPr>
-        </p:nvSpPr>
-        <p:spPr/>
-        <p:txBody>
-          <a:bodyPr/>
-          <a:lstStyle/>
-          <a:p>
-            <a:r>
-              <a:rPr lang="en-US"/>
-              <a:t>Conversion example</a:t>
-            </a:r>
-            <a:endParaRPr lang="en-US" dirty="0"/>
-          </a:p>
-        </p:txBody>
-      </p:sp>
-      <p:sp>
-        <p:nvSpPr>
-          <p:cNvPr id="4" name="Slide Number Placeholder 3"/>
-          <p:cNvSpPr>
-            <a:spLocks noGrp="1"/>
-          </p:cNvSpPr>
-          <p:nvPr>
-            <p:ph type="sldNum" sz="quarter" idx="12"/>
-          </p:nvPr>
-        </p:nvSpPr>
-        <p:spPr/>
-        <p:txBody>
-          <a:bodyPr/>
-          <a:lstStyle/>
-          <a:p>
-            <a:fld id="{030EE116-056E-4288-B7F7-411CB7E437A9}" type="slidenum">
-              <a:rPr lang="en-US" smtClean="0"/>
-              <a:pPr/>
-              <a:t>45</a:t>
-            </a:fld>
-            <a:endParaRPr lang="en-US"/>
-          </a:p>
-        </p:txBody>
-      </p:sp>
-      <p:sp>
-        <p:nvSpPr>
-          <p:cNvPr id="3" name="Content Placeholder 2"/>
-          <p:cNvSpPr>
-            <a:spLocks noGrp="1"/>
-          </p:cNvSpPr>
-          <p:nvPr>
-            <p:ph sz="quarter" idx="1"/>
-          </p:nvPr>
-        </p:nvSpPr>
-        <p:spPr/>
-        <p:txBody>
-          <a:bodyPr/>
-          <a:lstStyle/>
-          <a:p>
-            <a:r>
-              <a:rPr lang="en-US"/>
-              <a:t>Converting a graph with multiple sources and sinks to a single-source-single-sink max-flow problem:</a:t>
-            </a:r>
-            <a:endParaRPr lang="en-US" dirty="0"/>
-          </a:p>
-        </p:txBody>
-      </p:sp>
-      <p:pic>
-        <p:nvPicPr>
-          <p:cNvPr id="5" name="Picture 2" descr="C:\WINDOWS\Desktop\Oh_type\kleinberg_GIF_01to10\kleinberg_07F13.gif"/>
-          <p:cNvPicPr preferRelativeResize="0">
-            <a:picLocks noChangeAspect="1" noChangeArrowheads="1"/>
-          </p:cNvPicPr>
-          <p:nvPr>
-            <p:custDataLst>
-              <p:tags r:id="rId1"/>
-            </p:custDataLst>
-          </p:nvPr>
-        </p:nvPicPr>
-        <p:blipFill>
-          <a:blip r:embed="rId3">
-            <a:clrChange>
-              <a:clrFrom>
-                <a:srgbClr val="FFFFFF"/>
-              </a:clrFrom>
-              <a:clrTo>
-                <a:srgbClr val="FFFFFF">
-                  <a:alpha val="0"/>
-                </a:srgbClr>
-              </a:clrTo>
-            </a:clrChange>
-          </a:blip>
-          <a:srcRect r="22549" b="22161"/>
-          <a:stretch>
-            <a:fillRect/>
-          </a:stretch>
-        </p:blipFill>
-        <p:spPr bwMode="auto">
-          <a:xfrm>
-            <a:off x="761999" y="2971800"/>
-            <a:ext cx="7712199" cy="3429000"/>
-          </a:xfrm>
-          <a:prstGeom prst="rect">
-            <a:avLst/>
-          </a:prstGeom>
-          <a:noFill/>
-          <a:ln w="9525">
-            <a:noFill/>
-            <a:miter lim="800000"/>
-            <a:headEnd/>
-            <a:tailEnd/>
-          </a:ln>
-          <a:effectLst/>
-        </p:spPr>
-      </p:pic>
-    </p:spTree>
-  </p:cSld>
-  <p:clrMapOvr>
-    <a:masterClrMapping/>
-  </p:clrMapOvr>
-</p:sld>
-</file>
-
-<file path=ppt/slides/slide46.xml><?xml version="1.0" encoding="utf-8"?>
-<p:sld xmlns:a="http://schemas.openxmlformats.org/drawingml/2006/main" xmlns:r="http://schemas.openxmlformats.org/officeDocument/2006/relationships" xmlns:p="http://schemas.openxmlformats.org/presentationml/2006/main">
-  <p:cSld>
-    <p:spTree>
-      <p:nvGrpSpPr>
-        <p:cNvPr id="1" name=""/>
-        <p:cNvGrpSpPr/>
-        <p:nvPr/>
-      </p:nvGrpSpPr>
-      <p:grpSpPr>
-        <a:xfrm>
-          <a:off x="0" y="0"/>
-          <a:ext cx="0" cy="0"/>
-          <a:chOff x="0" y="0"/>
-          <a:chExt cx="0" cy="0"/>
-        </a:xfrm>
-      </p:grpSpPr>
-      <p:sp>
-        <p:nvSpPr>
-          <p:cNvPr id="2" name="Title 1"/>
-          <p:cNvSpPr>
-            <a:spLocks noGrp="1"/>
-          </p:cNvSpPr>
-          <p:nvPr>
-            <p:ph type="title"/>
-          </p:nvPr>
-        </p:nvSpPr>
-        <p:spPr/>
-        <p:txBody>
-          <a:bodyPr/>
-          <a:lstStyle/>
-          <a:p>
-            <a:r>
-              <a:rPr lang="en-US"/>
-              <a:t>Circulation notes</a:t>
-            </a:r>
-            <a:endParaRPr lang="en-US" dirty="0"/>
-          </a:p>
-        </p:txBody>
-      </p:sp>
-      <p:sp>
-        <p:nvSpPr>
-          <p:cNvPr id="4" name="Slide Number Placeholder 3"/>
-          <p:cNvSpPr>
-            <a:spLocks noGrp="1"/>
-          </p:cNvSpPr>
-          <p:nvPr>
-            <p:ph type="sldNum" sz="quarter" idx="12"/>
-          </p:nvPr>
-        </p:nvSpPr>
-        <p:spPr/>
-        <p:txBody>
-          <a:bodyPr/>
-          <a:lstStyle/>
-          <a:p>
-            <a:fld id="{030EE116-056E-4288-B7F7-411CB7E437A9}" type="slidenum">
-              <a:rPr lang="en-US" smtClean="0"/>
-              <a:pPr/>
-              <a:t>46</a:t>
-            </a:fld>
-            <a:endParaRPr lang="en-US"/>
-          </a:p>
-        </p:txBody>
-      </p:sp>
-      <p:sp>
-        <p:nvSpPr>
-          <p:cNvPr id="3" name="Content Placeholder 2"/>
-          <p:cNvSpPr>
-            <a:spLocks noGrp="1"/>
-          </p:cNvSpPr>
-          <p:nvPr>
-            <p:ph sz="quarter" idx="1"/>
-          </p:nvPr>
-        </p:nvSpPr>
-        <p:spPr/>
-        <p:txBody>
-          <a:bodyPr/>
-          <a:lstStyle/>
-          <a:p>
-            <a:r>
-              <a:rPr lang="en-US" dirty="0"/>
-              <a:t>A circulation problem is aiming for </a:t>
-            </a:r>
-            <a:r>
-              <a:rPr lang="en-US" i="1" dirty="0"/>
-              <a:t>feasibility</a:t>
-            </a:r>
-            <a:r>
-              <a:rPr lang="en-US" dirty="0"/>
-              <a:t>, not max flow</a:t>
-            </a:r>
-          </a:p>
-          <a:p>
-            <a:pPr lvl="1"/>
-            <a:r>
-              <a:rPr lang="en-US" dirty="0"/>
-              <a:t>But we use max flow to solve it</a:t>
-            </a:r>
-          </a:p>
-          <a:p>
-            <a:r>
-              <a:rPr lang="en-US" dirty="0"/>
-              <a:t>We set each edge from the super-source to each individual source to be the absolute value as the individual source’s demand</a:t>
-            </a:r>
-          </a:p>
-          <a:p>
-            <a:r>
-              <a:rPr lang="en-US" dirty="0"/>
-              <a:t>Max-flow is then run</a:t>
-            </a:r>
-          </a:p>
-          <a:p>
-            <a:r>
-              <a:rPr lang="en-US" dirty="0"/>
-              <a:t>If the total amount leaving the single-source is the SAME as the capacity of each outgoing edge, then the circulation is feasible</a:t>
-            </a:r>
-          </a:p>
-        </p:txBody>
-      </p:sp>
-    </p:spTree>
-  </p:cSld>
-  <p:clrMapOvr>
-    <a:masterClrMapping/>
-  </p:clrMapOvr>
-</p:sld>
-</file>
-
-<file path=ppt/slides/slide47.xml><?xml version="1.0" encoding="utf-8"?>
-<p:sld xmlns:a="http://schemas.openxmlformats.org/drawingml/2006/main" xmlns:r="http://schemas.openxmlformats.org/officeDocument/2006/relationships" xmlns:p="http://schemas.openxmlformats.org/presentationml/2006/main">
-  <p:cSld>
-    <p:spTree>
-      <p:nvGrpSpPr>
-        <p:cNvPr id="1" name=""/>
-        <p:cNvGrpSpPr/>
-        <p:nvPr/>
-      </p:nvGrpSpPr>
-      <p:grpSpPr>
-        <a:xfrm>
-          <a:off x="0" y="0"/>
-          <a:ext cx="0" cy="0"/>
-          <a:chOff x="0" y="0"/>
-          <a:chExt cx="0" cy="0"/>
-        </a:xfrm>
-      </p:grpSpPr>
-      <p:sp>
-        <p:nvSpPr>
-          <p:cNvPr id="2" name="Title 1"/>
-          <p:cNvSpPr>
-            <a:spLocks noGrp="1"/>
-          </p:cNvSpPr>
-          <p:nvPr>
-            <p:ph type="title"/>
-          </p:nvPr>
-        </p:nvSpPr>
-        <p:spPr/>
-        <p:txBody>
-          <a:bodyPr/>
-          <a:lstStyle/>
-          <a:p>
-            <a:r>
-              <a:rPr lang="en-US"/>
-              <a:t>Edge lower bounds</a:t>
-            </a:r>
-            <a:endParaRPr lang="en-US" dirty="0"/>
-          </a:p>
-        </p:txBody>
-      </p:sp>
-      <p:sp>
-        <p:nvSpPr>
-          <p:cNvPr id="4" name="Slide Number Placeholder 3"/>
-          <p:cNvSpPr>
-            <a:spLocks noGrp="1"/>
-          </p:cNvSpPr>
-          <p:nvPr>
-            <p:ph type="sldNum" sz="quarter" idx="12"/>
-          </p:nvPr>
-        </p:nvSpPr>
-        <p:spPr/>
-        <p:txBody>
-          <a:bodyPr/>
-          <a:lstStyle/>
-          <a:p>
-            <a:fld id="{030EE116-056E-4288-B7F7-411CB7E437A9}" type="slidenum">
-              <a:rPr lang="en-US" smtClean="0"/>
-              <a:pPr/>
-              <a:t>47</a:t>
-            </a:fld>
-            <a:endParaRPr lang="en-US"/>
-          </a:p>
-        </p:txBody>
-      </p:sp>
-      <p:sp>
-        <p:nvSpPr>
-          <p:cNvPr id="3" name="Content Placeholder 2"/>
-          <p:cNvSpPr>
-            <a:spLocks noGrp="1"/>
-          </p:cNvSpPr>
-          <p:nvPr>
-            <p:ph sz="quarter" idx="1"/>
-          </p:nvPr>
-        </p:nvSpPr>
-        <p:spPr/>
-        <p:txBody>
-          <a:bodyPr>
-            <a:normAutofit/>
-          </a:bodyPr>
-          <a:lstStyle/>
-          <a:p>
-            <a:r>
-              <a:rPr lang="en-US"/>
-              <a:t>So far, we have considered only the capacity of an edge: the upper bound on the flow</a:t>
-            </a:r>
-          </a:p>
-          <a:p>
-            <a:r>
-              <a:rPr lang="en-US"/>
-              <a:t>We also want to consider a lower bound on the flow on an edge</a:t>
-            </a:r>
-          </a:p>
-          <a:p>
-            <a:pPr lvl="1"/>
-            <a:r>
-              <a:rPr lang="en-US"/>
-              <a:t>i.e. forcing a certain amount of flow through an edge</a:t>
-            </a:r>
-          </a:p>
-          <a:p>
-            <a:r>
-              <a:rPr lang="en-US"/>
-              <a:t>We will reduce this to a circulation problem</a:t>
-            </a:r>
-          </a:p>
-          <a:p>
-            <a:pPr lvl="1"/>
-            <a:r>
-              <a:rPr lang="en-US"/>
-              <a:t>Which can then be reduced to a max-flow problem</a:t>
-            </a:r>
-            <a:endParaRPr lang="en-US" dirty="0"/>
-          </a:p>
-        </p:txBody>
-      </p:sp>
-    </p:spTree>
-  </p:cSld>
-  <p:clrMapOvr>
-    <a:masterClrMapping/>
-  </p:clrMapOvr>
-</p:sld>
-</file>
-
-<file path=ppt/slides/slide48.xml><?xml version="1.0" encoding="utf-8"?>
-<p:sld xmlns:a="http://schemas.openxmlformats.org/drawingml/2006/main" xmlns:r="http://schemas.openxmlformats.org/officeDocument/2006/relationships" xmlns:p="http://schemas.openxmlformats.org/presentationml/2006/main">
-  <p:cSld>
-    <p:spTree>
-      <p:nvGrpSpPr>
-        <p:cNvPr id="1" name=""/>
-        <p:cNvGrpSpPr/>
-        <p:nvPr/>
-      </p:nvGrpSpPr>
-      <p:grpSpPr>
-        <a:xfrm>
-          <a:off x="0" y="0"/>
-          <a:ext cx="0" cy="0"/>
-          <a:chOff x="0" y="0"/>
-          <a:chExt cx="0" cy="0"/>
-        </a:xfrm>
-      </p:grpSpPr>
-      <p:sp>
-        <p:nvSpPr>
-          <p:cNvPr id="2" name="Title 1"/>
-          <p:cNvSpPr>
-            <a:spLocks noGrp="1"/>
-          </p:cNvSpPr>
-          <p:nvPr>
-            <p:ph type="title"/>
-          </p:nvPr>
-        </p:nvSpPr>
-        <p:spPr/>
-        <p:txBody>
-          <a:bodyPr/>
-          <a:lstStyle/>
-          <a:p>
-            <a:r>
-              <a:rPr lang="en-US"/>
-              <a:t>Handling lower bounds</a:t>
-            </a:r>
-            <a:endParaRPr lang="en-US" dirty="0"/>
-          </a:p>
-        </p:txBody>
-      </p:sp>
-      <p:sp>
-        <p:nvSpPr>
-          <p:cNvPr id="4" name="Slide Number Placeholder 3"/>
-          <p:cNvSpPr>
-            <a:spLocks noGrp="1"/>
-          </p:cNvSpPr>
-          <p:nvPr>
-            <p:ph type="sldNum" sz="quarter" idx="12"/>
-          </p:nvPr>
-        </p:nvSpPr>
-        <p:spPr/>
-        <p:txBody>
-          <a:bodyPr/>
-          <a:lstStyle/>
-          <a:p>
-            <a:fld id="{030EE116-056E-4288-B7F7-411CB7E437A9}" type="slidenum">
-              <a:rPr lang="en-US" smtClean="0"/>
-              <a:pPr/>
-              <a:t>48</a:t>
-            </a:fld>
-            <a:endParaRPr lang="en-US"/>
-          </a:p>
-        </p:txBody>
-      </p:sp>
-      <p:sp>
-        <p:nvSpPr>
-          <p:cNvPr id="3" name="Content Placeholder 2"/>
-          <p:cNvSpPr>
-            <a:spLocks noGrp="1"/>
-          </p:cNvSpPr>
-          <p:nvPr>
-            <p:ph sz="quarter" idx="1"/>
-          </p:nvPr>
-        </p:nvSpPr>
-        <p:spPr/>
-        <p:txBody>
-          <a:bodyPr/>
-          <a:lstStyle/>
-          <a:p>
-            <a:r>
-              <a:rPr lang="en-US"/>
-              <a:t>A lower bound forces flow across an edge</a:t>
-            </a:r>
-          </a:p>
-          <a:p>
-            <a:pPr lvl="1"/>
-            <a:r>
-              <a:rPr lang="en-US"/>
-              <a:t>Which increases demand at the start of the edge (to compensate for the flow across the edge)</a:t>
-            </a:r>
-          </a:p>
-          <a:p>
-            <a:pPr lvl="1"/>
-            <a:r>
-              <a:rPr lang="en-US"/>
-              <a:t>And decreases demand at the terminus of the edge (as some flow is fulfilling the demand)</a:t>
-            </a:r>
-          </a:p>
-          <a:p>
-            <a:endParaRPr lang="en-US" dirty="0"/>
-          </a:p>
-        </p:txBody>
-      </p:sp>
-    </p:spTree>
-  </p:cSld>
-  <p:clrMapOvr>
-    <a:masterClrMapping/>
-  </p:clrMapOvr>
-</p:sld>
-</file>
-
-<file path=ppt/slides/slide49.xml><?xml version="1.0" encoding="utf-8"?>
-<p:sld xmlns:a="http://schemas.openxmlformats.org/drawingml/2006/main" xmlns:r="http://schemas.openxmlformats.org/officeDocument/2006/relationships" xmlns:p="http://schemas.openxmlformats.org/presentationml/2006/main">
-  <p:cSld>
-    <p:spTree>
-      <p:nvGrpSpPr>
-        <p:cNvPr id="1" name=""/>
-        <p:cNvGrpSpPr/>
-        <p:nvPr/>
-      </p:nvGrpSpPr>
-      <p:grpSpPr>
-        <a:xfrm>
-          <a:off x="0" y="0"/>
-          <a:ext cx="0" cy="0"/>
-          <a:chOff x="0" y="0"/>
-          <a:chExt cx="0" cy="0"/>
-        </a:xfrm>
-      </p:grpSpPr>
-      <p:sp>
-        <p:nvSpPr>
-          <p:cNvPr id="2" name="Title 1"/>
-          <p:cNvSpPr>
-            <a:spLocks noGrp="1"/>
-          </p:cNvSpPr>
-          <p:nvPr>
-            <p:ph type="title"/>
-          </p:nvPr>
-        </p:nvSpPr>
-        <p:spPr/>
-        <p:txBody>
-          <a:bodyPr>
-            <a:normAutofit/>
-          </a:bodyPr>
-          <a:lstStyle/>
-          <a:p>
-            <a:r>
-              <a:rPr lang="en-US"/>
-              <a:t>Solving a flow with lower bounds</a:t>
-            </a:r>
-            <a:endParaRPr lang="en-US" dirty="0"/>
-          </a:p>
-        </p:txBody>
-      </p:sp>
-      <p:sp>
-        <p:nvSpPr>
-          <p:cNvPr id="4" name="Slide Number Placeholder 3"/>
-          <p:cNvSpPr>
-            <a:spLocks noGrp="1"/>
-          </p:cNvSpPr>
-          <p:nvPr>
-            <p:ph type="sldNum" sz="quarter" idx="12"/>
-          </p:nvPr>
-        </p:nvSpPr>
-        <p:spPr/>
-        <p:txBody>
-          <a:bodyPr/>
-          <a:lstStyle/>
-          <a:p>
-            <a:fld id="{030EE116-056E-4288-B7F7-411CB7E437A9}" type="slidenum">
-              <a:rPr lang="en-US" smtClean="0"/>
-              <a:pPr/>
-              <a:t>49</a:t>
-            </a:fld>
-            <a:endParaRPr lang="en-US"/>
-          </a:p>
-        </p:txBody>
-      </p:sp>
-      <p:sp>
-        <p:nvSpPr>
-          <p:cNvPr id="3" name="Content Placeholder 2"/>
-          <p:cNvSpPr>
-            <a:spLocks noGrp="1"/>
-          </p:cNvSpPr>
-          <p:nvPr>
-            <p:ph sz="quarter" idx="1"/>
-          </p:nvPr>
-        </p:nvSpPr>
-        <p:spPr/>
-        <p:txBody>
-          <a:bodyPr>
-            <a:normAutofit/>
-          </a:bodyPr>
-          <a:lstStyle/>
-          <a:p>
-            <a:r>
-              <a:rPr lang="en-US"/>
-              <a:t>Given a circulation network G, construct a new graph G’ such that for each edge e from u to v with a  lower bound l</a:t>
-            </a:r>
-            <a:r>
-              <a:rPr lang="en-US" baseline="-25000"/>
-              <a:t>e</a:t>
-            </a:r>
-            <a:r>
-              <a:rPr lang="en-US"/>
-              <a:t>:</a:t>
-            </a:r>
-          </a:p>
-          <a:p>
-            <a:pPr lvl="1"/>
-            <a:r>
-              <a:rPr lang="en-US"/>
-              <a:t>We decrease the capacity on that edge by l</a:t>
-            </a:r>
-            <a:r>
-              <a:rPr lang="en-US" baseline="-25000"/>
-              <a:t>e</a:t>
-            </a:r>
-            <a:r>
-              <a:rPr lang="en-US"/>
-              <a:t> </a:t>
-            </a:r>
-          </a:p>
-          <a:p>
-            <a:pPr lvl="2"/>
-            <a:r>
-              <a:rPr lang="en-US"/>
-              <a:t>As that is the flow that is moving through the edge</a:t>
-            </a:r>
-          </a:p>
-          <a:p>
-            <a:pPr lvl="1"/>
-            <a:r>
-              <a:rPr lang="en-US"/>
-              <a:t>We increase the demand at u by l</a:t>
-            </a:r>
-            <a:r>
-              <a:rPr lang="en-US" baseline="-25000"/>
-              <a:t>e</a:t>
-            </a:r>
-            <a:r>
-              <a:rPr lang="en-US"/>
-              <a:t> </a:t>
-            </a:r>
-          </a:p>
-          <a:p>
-            <a:pPr lvl="1"/>
-            <a:r>
-              <a:rPr lang="en-US"/>
-              <a:t>We decrease the demand at v by l</a:t>
-            </a:r>
-            <a:r>
-              <a:rPr lang="en-US" baseline="-25000"/>
-              <a:t>e</a:t>
-            </a:r>
-            <a:r>
-              <a:rPr lang="en-US"/>
-              <a:t> </a:t>
-            </a:r>
-          </a:p>
-          <a:p>
-            <a:r>
-              <a:rPr lang="en-US"/>
-              <a:t>Then solve G’ as a circulation problem</a:t>
-            </a:r>
-          </a:p>
-          <a:p>
-            <a:pPr lvl="1"/>
-            <a:r>
-              <a:rPr lang="en-US"/>
-              <a:t>i.e. add a super-sink and super-terminus, and solve as a max-flow problem</a:t>
-            </a:r>
-            <a:endParaRPr lang="en-US" dirty="0"/>
-          </a:p>
-        </p:txBody>
-      </p:sp>
-    </p:spTree>
-  </p:cSld>
-  <p:clrMapOvr>
-    <a:masterClrMapping/>
-  </p:clrMapOvr>
-</p:sld>
-</file>
-
 <file path=ppt/slides/slide5.xml><?xml version="1.0" encoding="utf-8"?>
 <p:sld xmlns:a="http://schemas.openxmlformats.org/drawingml/2006/main" xmlns:r="http://schemas.openxmlformats.org/officeDocument/2006/relationships" xmlns:p="http://schemas.openxmlformats.org/presentationml/2006/main">
   <p:cSld>
@@ -11043,435 +7746,11 @@
         </p:blipFill>
         <p:spPr>
           <a:xfrm>
-            <a:off x="4632325" y="1768868"/>
+            <a:off x="6156326" y="1768868"/>
             <a:ext cx="4041775" cy="3831438"/>
           </a:xfrm>
         </p:spPr>
       </p:pic>
-    </p:spTree>
-  </p:cSld>
-  <p:clrMapOvr>
-    <a:masterClrMapping/>
-  </p:clrMapOvr>
-</p:sld>
-</file>
-
-<file path=ppt/slides/slide50.xml><?xml version="1.0" encoding="utf-8"?>
-<p:sld xmlns:a="http://schemas.openxmlformats.org/drawingml/2006/main" xmlns:r="http://schemas.openxmlformats.org/officeDocument/2006/relationships" xmlns:p="http://schemas.openxmlformats.org/presentationml/2006/main">
-  <p:cSld>
-    <p:spTree>
-      <p:nvGrpSpPr>
-        <p:cNvPr id="1" name=""/>
-        <p:cNvGrpSpPr/>
-        <p:nvPr/>
-      </p:nvGrpSpPr>
-      <p:grpSpPr>
-        <a:xfrm>
-          <a:off x="0" y="0"/>
-          <a:ext cx="0" cy="0"/>
-          <a:chOff x="0" y="0"/>
-          <a:chExt cx="0" cy="0"/>
-        </a:xfrm>
-      </p:grpSpPr>
-      <p:sp>
-        <p:nvSpPr>
-          <p:cNvPr id="2" name="Title 1"/>
-          <p:cNvSpPr>
-            <a:spLocks noGrp="1"/>
-          </p:cNvSpPr>
-          <p:nvPr>
-            <p:ph type="title"/>
-          </p:nvPr>
-        </p:nvSpPr>
-        <p:spPr/>
-        <p:txBody>
-          <a:bodyPr/>
-          <a:lstStyle/>
-          <a:p>
-            <a:r>
-              <a:rPr lang="en-US"/>
-              <a:t>Eliminating a lower bound</a:t>
-            </a:r>
-            <a:endParaRPr lang="en-US" dirty="0"/>
-          </a:p>
-        </p:txBody>
-      </p:sp>
-      <p:sp>
-        <p:nvSpPr>
-          <p:cNvPr id="4" name="Slide Number Placeholder 3"/>
-          <p:cNvSpPr>
-            <a:spLocks noGrp="1"/>
-          </p:cNvSpPr>
-          <p:nvPr>
-            <p:ph type="sldNum" sz="quarter" idx="12"/>
-          </p:nvPr>
-        </p:nvSpPr>
-        <p:spPr/>
-        <p:txBody>
-          <a:bodyPr/>
-          <a:lstStyle/>
-          <a:p>
-            <a:fld id="{030EE116-056E-4288-B7F7-411CB7E437A9}" type="slidenum">
-              <a:rPr lang="en-US" smtClean="0"/>
-              <a:pPr/>
-              <a:t>50</a:t>
-            </a:fld>
-            <a:endParaRPr lang="en-US"/>
-          </a:p>
-        </p:txBody>
-      </p:sp>
-      <p:sp>
-        <p:nvSpPr>
-          <p:cNvPr id="3" name="Content Placeholder 2"/>
-          <p:cNvSpPr>
-            <a:spLocks noGrp="1"/>
-          </p:cNvSpPr>
-          <p:nvPr>
-            <p:ph sz="quarter" idx="1"/>
-          </p:nvPr>
-        </p:nvSpPr>
-        <p:spPr/>
-        <p:txBody>
-          <a:bodyPr/>
-          <a:lstStyle/>
-          <a:p>
-            <a:r>
-              <a:rPr lang="en-US"/>
-              <a:t>Diagrammatically…</a:t>
-            </a:r>
-            <a:endParaRPr lang="en-US" dirty="0"/>
-          </a:p>
-        </p:txBody>
-      </p:sp>
-      <p:grpSp>
-        <p:nvGrpSpPr>
-          <p:cNvPr id="8" name="Group 7"/>
-          <p:cNvGrpSpPr/>
-          <p:nvPr/>
-        </p:nvGrpSpPr>
-        <p:grpSpPr>
-          <a:xfrm>
-            <a:off x="762000" y="2133600"/>
-            <a:ext cx="7391400" cy="3733800"/>
-            <a:chOff x="762000" y="2133600"/>
-            <a:chExt cx="7391400" cy="3733800"/>
-          </a:xfrm>
-        </p:grpSpPr>
-        <p:pic>
-          <p:nvPicPr>
-            <p:cNvPr id="5" name="Picture 2" descr="C:\WINDOWS\Desktop\Oh_type\kleinberg_GIF_01to10\kleinberg_07F15.gif"/>
-            <p:cNvPicPr preferRelativeResize="0">
-              <a:picLocks noChangeAspect="1" noChangeArrowheads="1"/>
-            </p:cNvPicPr>
-            <p:nvPr>
-              <p:custDataLst>
-                <p:tags r:id="rId1"/>
-              </p:custDataLst>
-            </p:nvPr>
-          </p:nvPicPr>
-          <p:blipFill>
-            <a:blip r:embed="rId3"/>
-            <a:srcRect b="22093"/>
-            <a:stretch>
-              <a:fillRect/>
-            </a:stretch>
-          </p:blipFill>
-          <p:spPr bwMode="auto">
-            <a:xfrm>
-              <a:off x="762000" y="2133600"/>
-              <a:ext cx="7391400" cy="3733800"/>
-            </a:xfrm>
-            <a:prstGeom prst="rect">
-              <a:avLst/>
-            </a:prstGeom>
-            <a:noFill/>
-            <a:ln w="9525">
-              <a:noFill/>
-              <a:miter lim="800000"/>
-              <a:headEnd/>
-              <a:tailEnd/>
-            </a:ln>
-            <a:effectLst/>
-          </p:spPr>
-        </p:pic>
-        <p:sp>
-          <p:nvSpPr>
-            <p:cNvPr id="6" name="Rectangle 5"/>
-            <p:cNvSpPr/>
-            <p:nvPr/>
-          </p:nvSpPr>
-          <p:spPr>
-            <a:xfrm>
-              <a:off x="4038600" y="2209800"/>
-              <a:ext cx="1905000" cy="685800"/>
-            </a:xfrm>
-            <a:prstGeom prst="rect">
-              <a:avLst/>
-            </a:prstGeom>
-            <a:solidFill>
-              <a:schemeClr val="bg1"/>
-            </a:solidFill>
-            <a:ln>
-              <a:noFill/>
-            </a:ln>
-          </p:spPr>
-          <p:style>
-            <a:lnRef idx="2">
-              <a:schemeClr val="accent1">
-                <a:shade val="50000"/>
-              </a:schemeClr>
-            </a:lnRef>
-            <a:fillRef idx="1">
-              <a:schemeClr val="accent1"/>
-            </a:fillRef>
-            <a:effectRef idx="0">
-              <a:schemeClr val="accent1"/>
-            </a:effectRef>
-            <a:fontRef idx="minor">
-              <a:schemeClr val="lt1"/>
-            </a:fontRef>
-          </p:style>
-          <p:txBody>
-            <a:bodyPr rtlCol="0" anchor="ctr"/>
-            <a:lstStyle/>
-            <a:p>
-              <a:pPr algn="ctr"/>
-              <a:endParaRPr lang="en-US"/>
-            </a:p>
-          </p:txBody>
-        </p:sp>
-      </p:grpSp>
-    </p:spTree>
-  </p:cSld>
-  <p:clrMapOvr>
-    <a:masterClrMapping/>
-  </p:clrMapOvr>
-</p:sld>
-</file>
-
-<file path=ppt/slides/slide51.xml><?xml version="1.0" encoding="utf-8"?>
-<p:sld xmlns:a="http://schemas.openxmlformats.org/drawingml/2006/main" xmlns:r="http://schemas.openxmlformats.org/officeDocument/2006/relationships" xmlns:p="http://schemas.openxmlformats.org/presentationml/2006/main">
-  <p:cSld>
-    <p:spTree>
-      <p:nvGrpSpPr>
-        <p:cNvPr id="1" name=""/>
-        <p:cNvGrpSpPr/>
-        <p:nvPr/>
-      </p:nvGrpSpPr>
-      <p:grpSpPr>
-        <a:xfrm>
-          <a:off x="0" y="0"/>
-          <a:ext cx="0" cy="0"/>
-          <a:chOff x="0" y="0"/>
-          <a:chExt cx="0" cy="0"/>
-        </a:xfrm>
-      </p:grpSpPr>
-      <p:sp>
-        <p:nvSpPr>
-          <p:cNvPr id="5" name="Title 4"/>
-          <p:cNvSpPr>
-            <a:spLocks noGrp="1"/>
-          </p:cNvSpPr>
-          <p:nvPr>
-            <p:ph type="title"/>
-          </p:nvPr>
-        </p:nvSpPr>
-        <p:spPr/>
-        <p:txBody>
-          <a:bodyPr/>
-          <a:lstStyle/>
-          <a:p>
-            <a:r>
-              <a:rPr lang="en-US"/>
-              <a:t>Summary</a:t>
-            </a:r>
-            <a:endParaRPr lang="en-US" dirty="0"/>
-          </a:p>
-        </p:txBody>
-      </p:sp>
-      <p:sp>
-        <p:nvSpPr>
-          <p:cNvPr id="6" name="Text Placeholder 5"/>
-          <p:cNvSpPr>
-            <a:spLocks noGrp="1"/>
-          </p:cNvSpPr>
-          <p:nvPr>
-            <p:ph type="body" idx="1"/>
-          </p:nvPr>
-        </p:nvSpPr>
-        <p:spPr/>
-        <p:txBody>
-          <a:bodyPr/>
-          <a:lstStyle/>
-          <a:p>
-            <a:endParaRPr lang="en-US"/>
-          </a:p>
-        </p:txBody>
-      </p:sp>
-      <p:sp>
-        <p:nvSpPr>
-          <p:cNvPr id="4" name="Slide Number Placeholder 3"/>
-          <p:cNvSpPr>
-            <a:spLocks noGrp="1"/>
-          </p:cNvSpPr>
-          <p:nvPr>
-            <p:ph type="sldNum" sz="quarter" idx="12"/>
-          </p:nvPr>
-        </p:nvSpPr>
-        <p:spPr/>
-        <p:txBody>
-          <a:bodyPr/>
-          <a:lstStyle/>
-          <a:p>
-            <a:fld id="{030EE116-056E-4288-B7F7-411CB7E437A9}" type="slidenum">
-              <a:rPr lang="en-US" smtClean="0"/>
-              <a:pPr/>
-              <a:t>51</a:t>
-            </a:fld>
-            <a:endParaRPr lang="en-US"/>
-          </a:p>
-        </p:txBody>
-      </p:sp>
-    </p:spTree>
-  </p:cSld>
-  <p:clrMapOvr>
-    <a:masterClrMapping/>
-  </p:clrMapOvr>
-</p:sld>
-</file>
-
-<file path=ppt/slides/slide52.xml><?xml version="1.0" encoding="utf-8"?>
-<p:sld xmlns:a="http://schemas.openxmlformats.org/drawingml/2006/main" xmlns:r="http://schemas.openxmlformats.org/officeDocument/2006/relationships" xmlns:p="http://schemas.openxmlformats.org/presentationml/2006/main">
-  <p:cSld>
-    <p:spTree>
-      <p:nvGrpSpPr>
-        <p:cNvPr id="1" name=""/>
-        <p:cNvGrpSpPr/>
-        <p:nvPr/>
-      </p:nvGrpSpPr>
-      <p:grpSpPr>
-        <a:xfrm>
-          <a:off x="0" y="0"/>
-          <a:ext cx="0" cy="0"/>
-          <a:chOff x="0" y="0"/>
-          <a:chExt cx="0" cy="0"/>
-        </a:xfrm>
-      </p:grpSpPr>
-      <p:sp>
-        <p:nvSpPr>
-          <p:cNvPr id="5" name="Title 4"/>
-          <p:cNvSpPr>
-            <a:spLocks noGrp="1"/>
-          </p:cNvSpPr>
-          <p:nvPr>
-            <p:ph type="title"/>
-          </p:nvPr>
-        </p:nvSpPr>
-        <p:spPr/>
-        <p:txBody>
-          <a:bodyPr/>
-          <a:lstStyle/>
-          <a:p>
-            <a:r>
-              <a:rPr lang="en-US" dirty="0"/>
-              <a:t>What did we learn?</a:t>
-            </a:r>
-          </a:p>
-        </p:txBody>
-      </p:sp>
-      <p:sp>
-        <p:nvSpPr>
-          <p:cNvPr id="4" name="Slide Number Placeholder 3"/>
-          <p:cNvSpPr>
-            <a:spLocks noGrp="1"/>
-          </p:cNvSpPr>
-          <p:nvPr>
-            <p:ph type="sldNum" sz="quarter" idx="12"/>
-          </p:nvPr>
-        </p:nvSpPr>
-        <p:spPr/>
-        <p:txBody>
-          <a:bodyPr/>
-          <a:lstStyle/>
-          <a:p>
-            <a:fld id="{030EE116-056E-4288-B7F7-411CB7E437A9}" type="slidenum">
-              <a:rPr lang="en-US" smtClean="0"/>
-              <a:pPr/>
-              <a:t>52</a:t>
-            </a:fld>
-            <a:endParaRPr lang="en-US"/>
-          </a:p>
-        </p:txBody>
-      </p:sp>
-      <p:sp>
-        <p:nvSpPr>
-          <p:cNvPr id="6" name="Content Placeholder 5"/>
-          <p:cNvSpPr>
-            <a:spLocks noGrp="1"/>
-          </p:cNvSpPr>
-          <p:nvPr>
-            <p:ph sz="quarter" idx="1"/>
-          </p:nvPr>
-        </p:nvSpPr>
-        <p:spPr/>
-        <p:txBody>
-          <a:bodyPr>
-            <a:normAutofit/>
-          </a:bodyPr>
-          <a:lstStyle/>
-          <a:p>
-            <a:r>
-              <a:rPr lang="en-US" dirty="0"/>
-              <a:t>Max-flow / min-cut</a:t>
-            </a:r>
-          </a:p>
-          <a:p>
-            <a:pPr lvl="1"/>
-            <a:r>
-              <a:rPr lang="en-US" dirty="0"/>
-              <a:t>The problems, relationship between them, etc.</a:t>
-            </a:r>
-          </a:p>
-          <a:p>
-            <a:pPr lvl="1"/>
-            <a:r>
-              <a:rPr lang="en-US" dirty="0"/>
-              <a:t>Ford-Fulkerson algorithm and related proofs that this approach is optimal</a:t>
-            </a:r>
-          </a:p>
-          <a:p>
-            <a:r>
-              <a:rPr lang="en-US" dirty="0"/>
-              <a:t>Bi-partite matching</a:t>
-            </a:r>
-          </a:p>
-          <a:p>
-            <a:pPr lvl="1"/>
-            <a:r>
-              <a:rPr lang="en-US" dirty="0"/>
-              <a:t>First example of a reduction. Use the algorithm from one problem to solve another problem.</a:t>
-            </a:r>
-          </a:p>
-          <a:p>
-            <a:r>
-              <a:rPr lang="en-US" dirty="0"/>
-              <a:t>More reductions</a:t>
-            </a:r>
-          </a:p>
-          <a:p>
-            <a:pPr lvl="1"/>
-            <a:r>
-              <a:rPr lang="en-US" dirty="0"/>
-              <a:t>Solving variations of max-flow by converting the problem into an instance of “normal</a:t>
-            </a:r>
-            <a:r>
-              <a:rPr lang="en-US"/>
-              <a:t>” max-flow.</a:t>
-            </a:r>
-            <a:endParaRPr lang="en-US" dirty="0"/>
-          </a:p>
-        </p:txBody>
-      </p:sp>
     </p:spTree>
   </p:cSld>
   <p:clrMapOvr>
@@ -12139,24 +8418,6 @@
 </p:tagLst>
 </file>
 
-<file path=ppt/tags/tag10.xml><?xml version="1.0" encoding="utf-8"?>
-<p:tagLst xmlns:a="http://schemas.openxmlformats.org/drawingml/2006/main" xmlns:r="http://schemas.openxmlformats.org/officeDocument/2006/relationships" xmlns:p="http://schemas.openxmlformats.org/presentationml/2006/main">
-  <p:tag name="IIW_TYPE_IMAGE" val="Text Box 3"/>
-</p:tagLst>
-</file>
-
-<file path=ppt/tags/tag11.xml><?xml version="1.0" encoding="utf-8"?>
-<p:tagLst xmlns:a="http://schemas.openxmlformats.org/drawingml/2006/main" xmlns:r="http://schemas.openxmlformats.org/officeDocument/2006/relationships" xmlns:p="http://schemas.openxmlformats.org/presentationml/2006/main">
-  <p:tag name="IIW_TYPE_IMAGE" val="Text Box 3"/>
-</p:tagLst>
-</file>
-
-<file path=ppt/tags/tag12.xml><?xml version="1.0" encoding="utf-8"?>
-<p:tagLst xmlns:a="http://schemas.openxmlformats.org/drawingml/2006/main" xmlns:r="http://schemas.openxmlformats.org/officeDocument/2006/relationships" xmlns:p="http://schemas.openxmlformats.org/presentationml/2006/main">
-  <p:tag name="IIW_TYPE_IMAGE" val="Text Box 3"/>
-</p:tagLst>
-</file>
-
 <file path=ppt/tags/tag2.xml><?xml version="1.0" encoding="utf-8"?>
 <p:tagLst xmlns:a="http://schemas.openxmlformats.org/drawingml/2006/main" xmlns:r="http://schemas.openxmlformats.org/officeDocument/2006/relationships" xmlns:p="http://schemas.openxmlformats.org/presentationml/2006/main">
   <p:tag name="_INSTRUCTOR VIEW19C14C36-AC8E-43BC-9DB6-C2AAF774C7DC|PANE__TAG" val="_"/>
@@ -12176,30 +8437,6 @@
 </file>
 
 <file path=ppt/tags/tag5.xml><?xml version="1.0" encoding="utf-8"?>
-<p:tagLst xmlns:a="http://schemas.openxmlformats.org/drawingml/2006/main" xmlns:r="http://schemas.openxmlformats.org/officeDocument/2006/relationships" xmlns:p="http://schemas.openxmlformats.org/presentationml/2006/main">
-  <p:tag name="IIW_TYPE_IMAGE" val="Text Box 3"/>
-</p:tagLst>
-</file>
-
-<file path=ppt/tags/tag6.xml><?xml version="1.0" encoding="utf-8"?>
-<p:tagLst xmlns:a="http://schemas.openxmlformats.org/drawingml/2006/main" xmlns:r="http://schemas.openxmlformats.org/officeDocument/2006/relationships" xmlns:p="http://schemas.openxmlformats.org/presentationml/2006/main">
-  <p:tag name="IIW_TYPE_IMAGE" val="Text Box 3"/>
-</p:tagLst>
-</file>
-
-<file path=ppt/tags/tag7.xml><?xml version="1.0" encoding="utf-8"?>
-<p:tagLst xmlns:a="http://schemas.openxmlformats.org/drawingml/2006/main" xmlns:r="http://schemas.openxmlformats.org/officeDocument/2006/relationships" xmlns:p="http://schemas.openxmlformats.org/presentationml/2006/main">
-  <p:tag name="IIW_TYPE_IMAGE" val="Text Box 3"/>
-</p:tagLst>
-</file>
-
-<file path=ppt/tags/tag8.xml><?xml version="1.0" encoding="utf-8"?>
-<p:tagLst xmlns:a="http://schemas.openxmlformats.org/drawingml/2006/main" xmlns:r="http://schemas.openxmlformats.org/officeDocument/2006/relationships" xmlns:p="http://schemas.openxmlformats.org/presentationml/2006/main">
-  <p:tag name="IIW_TYPE_IMAGE" val="Text Box 3"/>
-</p:tagLst>
-</file>
-
-<file path=ppt/tags/tag9.xml><?xml version="1.0" encoding="utf-8"?>
 <p:tagLst xmlns:a="http://schemas.openxmlformats.org/drawingml/2006/main" xmlns:r="http://schemas.openxmlformats.org/officeDocument/2006/relationships" xmlns:p="http://schemas.openxmlformats.org/presentationml/2006/main">
   <p:tag name="IIW_TYPE_IMAGE" val="Text Box 3"/>
 </p:tagLst>

</xml_diff>